<commit_message>
Last changes in docs. The project is adjourned. Thanks, it were a great nights. Bye! See you soon!
</commit_message>
<xml_diff>
--- a/Documentation/Сортировка Шелла. Чернавский Алексей.pptx
+++ b/Documentation/Сортировка Шелла. Чернавский Алексей.pptx
@@ -2,8 +2,23 @@
 <file path=ppt/presentation.xml><?xml version="1.0" encoding="utf-8"?>
 <p:presentation xmlns:a="http://schemas.openxmlformats.org/drawingml/2006/main" xmlns:r="http://schemas.openxmlformats.org/officeDocument/2006/relationships" xmlns:p="http://schemas.openxmlformats.org/presentationml/2006/main" saveSubsetFonts="1">
   <p:sldMasterIdLst>
-    <p:sldMasterId id="2147483648" r:id="rId1"/>
+    <p:sldMasterId id="2147483660" r:id="rId1"/>
   </p:sldMasterIdLst>
+  <p:sldIdLst>
+    <p:sldId id="256" r:id="rId2"/>
+    <p:sldId id="258" r:id="rId3"/>
+    <p:sldId id="259" r:id="rId4"/>
+    <p:sldId id="260" r:id="rId5"/>
+    <p:sldId id="261" r:id="rId6"/>
+    <p:sldId id="262" r:id="rId7"/>
+    <p:sldId id="263" r:id="rId8"/>
+    <p:sldId id="264" r:id="rId9"/>
+    <p:sldId id="265" r:id="rId10"/>
+    <p:sldId id="266" r:id="rId11"/>
+    <p:sldId id="267" r:id="rId12"/>
+    <p:sldId id="268" r:id="rId13"/>
+    <p:sldId id="269" r:id="rId14"/>
+  </p:sldIdLst>
   <p:sldSz cx="9144000" cy="6858000" type="screen4x3"/>
   <p:notesSz cx="6858000" cy="9144000"/>
   <p:defaultTextStyle>
@@ -123,7 +138,7 @@
       </p:grpSpPr>
       <p:sp>
         <p:nvSpPr>
-          <p:cNvPr id="2" name="Заголовок 1"/>
+          <p:cNvPr id="2" name="Title 1"/>
           <p:cNvSpPr>
             <a:spLocks noGrp="1"/>
           </p:cNvSpPr>
@@ -133,25 +148,29 @@
         </p:nvSpPr>
         <p:spPr>
           <a:xfrm>
-            <a:off x="685800" y="2130425"/>
-            <a:ext cx="7772400" cy="1470025"/>
+            <a:off x="685800" y="1122363"/>
+            <a:ext cx="7772400" cy="2387600"/>
           </a:xfrm>
         </p:spPr>
         <p:txBody>
-          <a:bodyPr/>
-          <a:lstStyle/>
+          <a:bodyPr anchor="b"/>
+          <a:lstStyle>
+            <a:lvl1pPr algn="ctr">
+              <a:defRPr sz="6000"/>
+            </a:lvl1pPr>
+          </a:lstStyle>
           <a:p>
             <a:r>
               <a:rPr lang="ru-RU" smtClean="0"/>
               <a:t>Образец заголовка</a:t>
             </a:r>
-            <a:endParaRPr lang="ru-RU"/>
-          </a:p>
-        </p:txBody>
-      </p:sp>
-      <p:sp>
-        <p:nvSpPr>
-          <p:cNvPr id="3" name="Подзаголовок 2"/>
+            <a:endParaRPr lang="en-US" dirty="0"/>
+          </a:p>
+        </p:txBody>
+      </p:sp>
+      <p:sp>
+        <p:nvSpPr>
+          <p:cNvPr id="3" name="Subtitle 2"/>
           <p:cNvSpPr>
             <a:spLocks noGrp="1"/>
           </p:cNvSpPr>
@@ -161,8 +180,8 @@
         </p:nvSpPr>
         <p:spPr>
           <a:xfrm>
-            <a:off x="1371600" y="3886200"/>
-            <a:ext cx="6400800" cy="1752600"/>
+            <a:off x="1143000" y="3602038"/>
+            <a:ext cx="6858000" cy="1655762"/>
           </a:xfrm>
         </p:spPr>
         <p:txBody>
@@ -170,93 +189,39 @@
           <a:lstStyle>
             <a:lvl1pPr marL="0" indent="0" algn="ctr">
               <a:buNone/>
-              <a:defRPr>
-                <a:solidFill>
-                  <a:schemeClr val="tx1">
-                    <a:tint val="75000"/>
-                  </a:schemeClr>
-                </a:solidFill>
-              </a:defRPr>
+              <a:defRPr sz="2400"/>
             </a:lvl1pPr>
             <a:lvl2pPr marL="457200" indent="0" algn="ctr">
               <a:buNone/>
-              <a:defRPr>
-                <a:solidFill>
-                  <a:schemeClr val="tx1">
-                    <a:tint val="75000"/>
-                  </a:schemeClr>
-                </a:solidFill>
-              </a:defRPr>
+              <a:defRPr sz="2000"/>
             </a:lvl2pPr>
             <a:lvl3pPr marL="914400" indent="0" algn="ctr">
               <a:buNone/>
-              <a:defRPr>
-                <a:solidFill>
-                  <a:schemeClr val="tx1">
-                    <a:tint val="75000"/>
-                  </a:schemeClr>
-                </a:solidFill>
-              </a:defRPr>
+              <a:defRPr sz="1800"/>
             </a:lvl3pPr>
             <a:lvl4pPr marL="1371600" indent="0" algn="ctr">
               <a:buNone/>
-              <a:defRPr>
-                <a:solidFill>
-                  <a:schemeClr val="tx1">
-                    <a:tint val="75000"/>
-                  </a:schemeClr>
-                </a:solidFill>
-              </a:defRPr>
+              <a:defRPr sz="1600"/>
             </a:lvl4pPr>
             <a:lvl5pPr marL="1828800" indent="0" algn="ctr">
               <a:buNone/>
-              <a:defRPr>
-                <a:solidFill>
-                  <a:schemeClr val="tx1">
-                    <a:tint val="75000"/>
-                  </a:schemeClr>
-                </a:solidFill>
-              </a:defRPr>
+              <a:defRPr sz="1600"/>
             </a:lvl5pPr>
             <a:lvl6pPr marL="2286000" indent="0" algn="ctr">
               <a:buNone/>
-              <a:defRPr>
-                <a:solidFill>
-                  <a:schemeClr val="tx1">
-                    <a:tint val="75000"/>
-                  </a:schemeClr>
-                </a:solidFill>
-              </a:defRPr>
+              <a:defRPr sz="1600"/>
             </a:lvl6pPr>
             <a:lvl7pPr marL="2743200" indent="0" algn="ctr">
               <a:buNone/>
-              <a:defRPr>
-                <a:solidFill>
-                  <a:schemeClr val="tx1">
-                    <a:tint val="75000"/>
-                  </a:schemeClr>
-                </a:solidFill>
-              </a:defRPr>
+              <a:defRPr sz="1600"/>
             </a:lvl7pPr>
             <a:lvl8pPr marL="3200400" indent="0" algn="ctr">
               <a:buNone/>
-              <a:defRPr>
-                <a:solidFill>
-                  <a:schemeClr val="tx1">
-                    <a:tint val="75000"/>
-                  </a:schemeClr>
-                </a:solidFill>
-              </a:defRPr>
+              <a:defRPr sz="1600"/>
             </a:lvl8pPr>
             <a:lvl9pPr marL="3657600" indent="0" algn="ctr">
               <a:buNone/>
-              <a:defRPr>
-                <a:solidFill>
-                  <a:schemeClr val="tx1">
-                    <a:tint val="75000"/>
-                  </a:schemeClr>
-                </a:solidFill>
-              </a:defRPr>
+              <a:defRPr sz="1600"/>
             </a:lvl9pPr>
           </a:lstStyle>
           <a:p>
@@ -264,13 +229,13 @@
               <a:rPr lang="ru-RU" smtClean="0"/>
               <a:t>Образец подзаголовка</a:t>
             </a:r>
-            <a:endParaRPr lang="ru-RU"/>
-          </a:p>
-        </p:txBody>
-      </p:sp>
-      <p:sp>
-        <p:nvSpPr>
-          <p:cNvPr id="4" name="Дата 3"/>
+            <a:endParaRPr lang="en-US" dirty="0"/>
+          </a:p>
+        </p:txBody>
+      </p:sp>
+      <p:sp>
+        <p:nvSpPr>
+          <p:cNvPr id="4" name="Date Placeholder 3"/>
           <p:cNvSpPr>
             <a:spLocks noGrp="1"/>
           </p:cNvSpPr>
@@ -283,9 +248,9 @@
           <a:bodyPr/>
           <a:lstStyle/>
           <a:p>
-            <a:fld id="{B4C71EC6-210F-42DE-9C53-41977AD35B3D}" type="datetimeFigureOut">
-              <a:rPr lang="ru-RU" smtClean="0"/>
-              <a:t>12.11.2009</a:t>
+            <a:fld id="{27FFA9D7-9CD8-41BC-B0CB-510313C07A99}" type="datetimeFigureOut">
+              <a:rPr lang="ru-RU" smtClean="0"/>
+              <a:t>14.06.2016</a:t>
             </a:fld>
             <a:endParaRPr lang="ru-RU"/>
           </a:p>
@@ -293,7 +258,7 @@
       </p:sp>
       <p:sp>
         <p:nvSpPr>
-          <p:cNvPr id="5" name="Нижний колонтитул 4"/>
+          <p:cNvPr id="5" name="Footer Placeholder 4"/>
           <p:cNvSpPr>
             <a:spLocks noGrp="1"/>
           </p:cNvSpPr>
@@ -312,7 +277,7 @@
       </p:sp>
       <p:sp>
         <p:nvSpPr>
-          <p:cNvPr id="6" name="Номер слайда 5"/>
+          <p:cNvPr id="6" name="Slide Number Placeholder 5"/>
           <p:cNvSpPr>
             <a:spLocks noGrp="1"/>
           </p:cNvSpPr>
@@ -325,7 +290,7 @@
           <a:bodyPr/>
           <a:lstStyle/>
           <a:p>
-            <a:fld id="{B19B0651-EE4F-4900-A07F-96A6BFA9D0F0}" type="slidenum">
+            <a:fld id="{AD077826-35F6-45AF-B5AB-3734735C3DD3}" type="slidenum">
               <a:rPr lang="ru-RU" smtClean="0"/>
               <a:t>‹#›</a:t>
             </a:fld>
@@ -334,6 +299,11 @@
         </p:txBody>
       </p:sp>
     </p:spTree>
+    <p:extLst>
+      <p:ext uri="{BB962C8B-B14F-4D97-AF65-F5344CB8AC3E}">
+        <p14:creationId xmlns:p14="http://schemas.microsoft.com/office/powerpoint/2010/main" val="2398267310"/>
+      </p:ext>
+    </p:extLst>
   </p:cSld>
   <p:clrMapOvr>
     <a:masterClrMapping/>
@@ -360,7 +330,7 @@
       </p:grpSpPr>
       <p:sp>
         <p:nvSpPr>
-          <p:cNvPr id="2" name="Заголовок 1"/>
+          <p:cNvPr id="2" name="Title 1"/>
           <p:cNvSpPr>
             <a:spLocks noGrp="1"/>
           </p:cNvSpPr>
@@ -377,13 +347,13 @@
               <a:rPr lang="ru-RU" smtClean="0"/>
               <a:t>Образец заголовка</a:t>
             </a:r>
-            <a:endParaRPr lang="ru-RU"/>
-          </a:p>
-        </p:txBody>
-      </p:sp>
-      <p:sp>
-        <p:nvSpPr>
-          <p:cNvPr id="3" name="Вертикальный текст 2"/>
+            <a:endParaRPr lang="en-US" dirty="0"/>
+          </a:p>
+        </p:txBody>
+      </p:sp>
+      <p:sp>
+        <p:nvSpPr>
+          <p:cNvPr id="3" name="Vertical Text Placeholder 2"/>
           <p:cNvSpPr>
             <a:spLocks noGrp="1"/>
           </p:cNvSpPr>
@@ -429,13 +399,13 @@
               <a:rPr lang="ru-RU" smtClean="0"/>
               <a:t>Пятый уровень</a:t>
             </a:r>
-            <a:endParaRPr lang="ru-RU"/>
-          </a:p>
-        </p:txBody>
-      </p:sp>
-      <p:sp>
-        <p:nvSpPr>
-          <p:cNvPr id="4" name="Дата 3"/>
+            <a:endParaRPr lang="en-US" dirty="0"/>
+          </a:p>
+        </p:txBody>
+      </p:sp>
+      <p:sp>
+        <p:nvSpPr>
+          <p:cNvPr id="4" name="Date Placeholder 3"/>
           <p:cNvSpPr>
             <a:spLocks noGrp="1"/>
           </p:cNvSpPr>
@@ -448,9 +418,9 @@
           <a:bodyPr/>
           <a:lstStyle/>
           <a:p>
-            <a:fld id="{B4C71EC6-210F-42DE-9C53-41977AD35B3D}" type="datetimeFigureOut">
-              <a:rPr lang="ru-RU" smtClean="0"/>
-              <a:t>12.11.2009</a:t>
+            <a:fld id="{27FFA9D7-9CD8-41BC-B0CB-510313C07A99}" type="datetimeFigureOut">
+              <a:rPr lang="ru-RU" smtClean="0"/>
+              <a:t>14.06.2016</a:t>
             </a:fld>
             <a:endParaRPr lang="ru-RU"/>
           </a:p>
@@ -458,7 +428,7 @@
       </p:sp>
       <p:sp>
         <p:nvSpPr>
-          <p:cNvPr id="5" name="Нижний колонтитул 4"/>
+          <p:cNvPr id="5" name="Footer Placeholder 4"/>
           <p:cNvSpPr>
             <a:spLocks noGrp="1"/>
           </p:cNvSpPr>
@@ -477,7 +447,7 @@
       </p:sp>
       <p:sp>
         <p:nvSpPr>
-          <p:cNvPr id="6" name="Номер слайда 5"/>
+          <p:cNvPr id="6" name="Slide Number Placeholder 5"/>
           <p:cNvSpPr>
             <a:spLocks noGrp="1"/>
           </p:cNvSpPr>
@@ -490,7 +460,7 @@
           <a:bodyPr/>
           <a:lstStyle/>
           <a:p>
-            <a:fld id="{B19B0651-EE4F-4900-A07F-96A6BFA9D0F0}" type="slidenum">
+            <a:fld id="{AD077826-35F6-45AF-B5AB-3734735C3DD3}" type="slidenum">
               <a:rPr lang="ru-RU" smtClean="0"/>
               <a:t>‹#›</a:t>
             </a:fld>
@@ -499,6 +469,11 @@
         </p:txBody>
       </p:sp>
     </p:spTree>
+    <p:extLst>
+      <p:ext uri="{BB962C8B-B14F-4D97-AF65-F5344CB8AC3E}">
+        <p14:creationId xmlns:p14="http://schemas.microsoft.com/office/powerpoint/2010/main" val="255793294"/>
+      </p:ext>
+    </p:extLst>
   </p:cSld>
   <p:clrMapOvr>
     <a:masterClrMapping/>
@@ -525,7 +500,7 @@
       </p:grpSpPr>
       <p:sp>
         <p:nvSpPr>
-          <p:cNvPr id="2" name="Вертикальный заголовок 1"/>
+          <p:cNvPr id="2" name="Vertical Title 1"/>
           <p:cNvSpPr>
             <a:spLocks noGrp="1"/>
           </p:cNvSpPr>
@@ -535,8 +510,8 @@
         </p:nvSpPr>
         <p:spPr>
           <a:xfrm>
-            <a:off x="6629400" y="274638"/>
-            <a:ext cx="2057400" cy="5851525"/>
+            <a:off x="6543675" y="365125"/>
+            <a:ext cx="1971675" cy="5811838"/>
           </a:xfrm>
         </p:spPr>
         <p:txBody>
@@ -547,13 +522,13 @@
               <a:rPr lang="ru-RU" smtClean="0"/>
               <a:t>Образец заголовка</a:t>
             </a:r>
-            <a:endParaRPr lang="ru-RU"/>
-          </a:p>
-        </p:txBody>
-      </p:sp>
-      <p:sp>
-        <p:nvSpPr>
-          <p:cNvPr id="3" name="Вертикальный текст 2"/>
+            <a:endParaRPr lang="en-US" dirty="0"/>
+          </a:p>
+        </p:txBody>
+      </p:sp>
+      <p:sp>
+        <p:nvSpPr>
+          <p:cNvPr id="3" name="Vertical Text Placeholder 2"/>
           <p:cNvSpPr>
             <a:spLocks noGrp="1"/>
           </p:cNvSpPr>
@@ -563,8 +538,8 @@
         </p:nvSpPr>
         <p:spPr>
           <a:xfrm>
-            <a:off x="457200" y="274638"/>
-            <a:ext cx="6019800" cy="5851525"/>
+            <a:off x="628650" y="365125"/>
+            <a:ext cx="5800725" cy="5811838"/>
           </a:xfrm>
         </p:spPr>
         <p:txBody>
@@ -604,13 +579,13 @@
               <a:rPr lang="ru-RU" smtClean="0"/>
               <a:t>Пятый уровень</a:t>
             </a:r>
-            <a:endParaRPr lang="ru-RU"/>
-          </a:p>
-        </p:txBody>
-      </p:sp>
-      <p:sp>
-        <p:nvSpPr>
-          <p:cNvPr id="4" name="Дата 3"/>
+            <a:endParaRPr lang="en-US" dirty="0"/>
+          </a:p>
+        </p:txBody>
+      </p:sp>
+      <p:sp>
+        <p:nvSpPr>
+          <p:cNvPr id="4" name="Date Placeholder 3"/>
           <p:cNvSpPr>
             <a:spLocks noGrp="1"/>
           </p:cNvSpPr>
@@ -623,9 +598,9 @@
           <a:bodyPr/>
           <a:lstStyle/>
           <a:p>
-            <a:fld id="{B4C71EC6-210F-42DE-9C53-41977AD35B3D}" type="datetimeFigureOut">
-              <a:rPr lang="ru-RU" smtClean="0"/>
-              <a:t>12.11.2009</a:t>
+            <a:fld id="{27FFA9D7-9CD8-41BC-B0CB-510313C07A99}" type="datetimeFigureOut">
+              <a:rPr lang="ru-RU" smtClean="0"/>
+              <a:t>14.06.2016</a:t>
             </a:fld>
             <a:endParaRPr lang="ru-RU"/>
           </a:p>
@@ -633,7 +608,7 @@
       </p:sp>
       <p:sp>
         <p:nvSpPr>
-          <p:cNvPr id="5" name="Нижний колонтитул 4"/>
+          <p:cNvPr id="5" name="Footer Placeholder 4"/>
           <p:cNvSpPr>
             <a:spLocks noGrp="1"/>
           </p:cNvSpPr>
@@ -652,7 +627,7 @@
       </p:sp>
       <p:sp>
         <p:nvSpPr>
-          <p:cNvPr id="6" name="Номер слайда 5"/>
+          <p:cNvPr id="6" name="Slide Number Placeholder 5"/>
           <p:cNvSpPr>
             <a:spLocks noGrp="1"/>
           </p:cNvSpPr>
@@ -665,7 +640,7 @@
           <a:bodyPr/>
           <a:lstStyle/>
           <a:p>
-            <a:fld id="{B19B0651-EE4F-4900-A07F-96A6BFA9D0F0}" type="slidenum">
+            <a:fld id="{AD077826-35F6-45AF-B5AB-3734735C3DD3}" type="slidenum">
               <a:rPr lang="ru-RU" smtClean="0"/>
               <a:t>‹#›</a:t>
             </a:fld>
@@ -674,6 +649,11 @@
         </p:txBody>
       </p:sp>
     </p:spTree>
+    <p:extLst>
+      <p:ext uri="{BB962C8B-B14F-4D97-AF65-F5344CB8AC3E}">
+        <p14:creationId xmlns:p14="http://schemas.microsoft.com/office/powerpoint/2010/main" val="1933236718"/>
+      </p:ext>
+    </p:extLst>
   </p:cSld>
   <p:clrMapOvr>
     <a:masterClrMapping/>
@@ -700,7 +680,7 @@
       </p:grpSpPr>
       <p:sp>
         <p:nvSpPr>
-          <p:cNvPr id="2" name="Заголовок 1"/>
+          <p:cNvPr id="2" name="Title 1"/>
           <p:cNvSpPr>
             <a:spLocks noGrp="1"/>
           </p:cNvSpPr>
@@ -717,13 +697,13 @@
               <a:rPr lang="ru-RU" smtClean="0"/>
               <a:t>Образец заголовка</a:t>
             </a:r>
-            <a:endParaRPr lang="ru-RU"/>
-          </a:p>
-        </p:txBody>
-      </p:sp>
-      <p:sp>
-        <p:nvSpPr>
-          <p:cNvPr id="3" name="Содержимое 2"/>
+            <a:endParaRPr lang="en-US" dirty="0"/>
+          </a:p>
+        </p:txBody>
+      </p:sp>
+      <p:sp>
+        <p:nvSpPr>
+          <p:cNvPr id="3" name="Content Placeholder 2"/>
           <p:cNvSpPr>
             <a:spLocks noGrp="1"/>
           </p:cNvSpPr>
@@ -769,13 +749,13 @@
               <a:rPr lang="ru-RU" smtClean="0"/>
               <a:t>Пятый уровень</a:t>
             </a:r>
-            <a:endParaRPr lang="ru-RU"/>
-          </a:p>
-        </p:txBody>
-      </p:sp>
-      <p:sp>
-        <p:nvSpPr>
-          <p:cNvPr id="4" name="Дата 3"/>
+            <a:endParaRPr lang="en-US" dirty="0"/>
+          </a:p>
+        </p:txBody>
+      </p:sp>
+      <p:sp>
+        <p:nvSpPr>
+          <p:cNvPr id="4" name="Date Placeholder 3"/>
           <p:cNvSpPr>
             <a:spLocks noGrp="1"/>
           </p:cNvSpPr>
@@ -788,9 +768,9 @@
           <a:bodyPr/>
           <a:lstStyle/>
           <a:p>
-            <a:fld id="{B4C71EC6-210F-42DE-9C53-41977AD35B3D}" type="datetimeFigureOut">
-              <a:rPr lang="ru-RU" smtClean="0"/>
-              <a:t>12.11.2009</a:t>
+            <a:fld id="{27FFA9D7-9CD8-41BC-B0CB-510313C07A99}" type="datetimeFigureOut">
+              <a:rPr lang="ru-RU" smtClean="0"/>
+              <a:t>14.06.2016</a:t>
             </a:fld>
             <a:endParaRPr lang="ru-RU"/>
           </a:p>
@@ -798,7 +778,7 @@
       </p:sp>
       <p:sp>
         <p:nvSpPr>
-          <p:cNvPr id="5" name="Нижний колонтитул 4"/>
+          <p:cNvPr id="5" name="Footer Placeholder 4"/>
           <p:cNvSpPr>
             <a:spLocks noGrp="1"/>
           </p:cNvSpPr>
@@ -817,7 +797,7 @@
       </p:sp>
       <p:sp>
         <p:nvSpPr>
-          <p:cNvPr id="6" name="Номер слайда 5"/>
+          <p:cNvPr id="6" name="Slide Number Placeholder 5"/>
           <p:cNvSpPr>
             <a:spLocks noGrp="1"/>
           </p:cNvSpPr>
@@ -830,7 +810,7 @@
           <a:bodyPr/>
           <a:lstStyle/>
           <a:p>
-            <a:fld id="{B19B0651-EE4F-4900-A07F-96A6BFA9D0F0}" type="slidenum">
+            <a:fld id="{AD077826-35F6-45AF-B5AB-3734735C3DD3}" type="slidenum">
               <a:rPr lang="ru-RU" smtClean="0"/>
               <a:t>‹#›</a:t>
             </a:fld>
@@ -839,6 +819,11 @@
         </p:txBody>
       </p:sp>
     </p:spTree>
+    <p:extLst>
+      <p:ext uri="{BB962C8B-B14F-4D97-AF65-F5344CB8AC3E}">
+        <p14:creationId xmlns:p14="http://schemas.microsoft.com/office/powerpoint/2010/main" val="2055340767"/>
+      </p:ext>
+    </p:extLst>
   </p:cSld>
   <p:clrMapOvr>
     <a:masterClrMapping/>
@@ -865,7 +850,7 @@
       </p:grpSpPr>
       <p:sp>
         <p:nvSpPr>
-          <p:cNvPr id="2" name="Заголовок 1"/>
+          <p:cNvPr id="2" name="Title 1"/>
           <p:cNvSpPr>
             <a:spLocks noGrp="1"/>
           </p:cNvSpPr>
@@ -875,15 +860,15 @@
         </p:nvSpPr>
         <p:spPr>
           <a:xfrm>
-            <a:off x="722313" y="4406900"/>
-            <a:ext cx="7772400" cy="1362075"/>
+            <a:off x="623888" y="1709739"/>
+            <a:ext cx="7886700" cy="2852737"/>
           </a:xfrm>
         </p:spPr>
         <p:txBody>
-          <a:bodyPr anchor="t"/>
+          <a:bodyPr anchor="b"/>
           <a:lstStyle>
-            <a:lvl1pPr algn="l">
-              <a:defRPr sz="4000" b="1" cap="all"/>
+            <a:lvl1pPr>
+              <a:defRPr sz="6000"/>
             </a:lvl1pPr>
           </a:lstStyle>
           <a:p>
@@ -891,13 +876,13 @@
               <a:rPr lang="ru-RU" smtClean="0"/>
               <a:t>Образец заголовка</a:t>
             </a:r>
-            <a:endParaRPr lang="ru-RU"/>
-          </a:p>
-        </p:txBody>
-      </p:sp>
-      <p:sp>
-        <p:nvSpPr>
-          <p:cNvPr id="3" name="Текст 2"/>
+            <a:endParaRPr lang="en-US" dirty="0"/>
+          </a:p>
+        </p:txBody>
+      </p:sp>
+      <p:sp>
+        <p:nvSpPr>
+          <p:cNvPr id="3" name="Text Placeholder 2"/>
           <p:cNvSpPr>
             <a:spLocks noGrp="1"/>
           </p:cNvSpPr>
@@ -907,26 +892,24 @@
         </p:nvSpPr>
         <p:spPr>
           <a:xfrm>
-            <a:off x="722313" y="2906713"/>
-            <a:ext cx="7772400" cy="1500187"/>
+            <a:off x="623888" y="4589464"/>
+            <a:ext cx="7886700" cy="1500187"/>
           </a:xfrm>
         </p:spPr>
         <p:txBody>
-          <a:bodyPr anchor="b"/>
+          <a:bodyPr/>
           <a:lstStyle>
             <a:lvl1pPr marL="0" indent="0">
               <a:buNone/>
-              <a:defRPr sz="2000">
+              <a:defRPr sz="2400">
                 <a:solidFill>
-                  <a:schemeClr val="tx1">
-                    <a:tint val="75000"/>
-                  </a:schemeClr>
+                  <a:schemeClr val="tx1"/>
                 </a:solidFill>
               </a:defRPr>
             </a:lvl1pPr>
             <a:lvl2pPr marL="457200" indent="0">
               <a:buNone/>
-              <a:defRPr sz="1800">
+              <a:defRPr sz="2000">
                 <a:solidFill>
                   <a:schemeClr val="tx1">
                     <a:tint val="75000"/>
@@ -936,7 +919,7 @@
             </a:lvl2pPr>
             <a:lvl3pPr marL="914400" indent="0">
               <a:buNone/>
-              <a:defRPr sz="1600">
+              <a:defRPr sz="1800">
                 <a:solidFill>
                   <a:schemeClr val="tx1">
                     <a:tint val="75000"/>
@@ -946,7 +929,7 @@
             </a:lvl3pPr>
             <a:lvl4pPr marL="1371600" indent="0">
               <a:buNone/>
-              <a:defRPr sz="1400">
+              <a:defRPr sz="1600">
                 <a:solidFill>
                   <a:schemeClr val="tx1">
                     <a:tint val="75000"/>
@@ -956,7 +939,7 @@
             </a:lvl4pPr>
             <a:lvl5pPr marL="1828800" indent="0">
               <a:buNone/>
-              <a:defRPr sz="1400">
+              <a:defRPr sz="1600">
                 <a:solidFill>
                   <a:schemeClr val="tx1">
                     <a:tint val="75000"/>
@@ -966,7 +949,7 @@
             </a:lvl5pPr>
             <a:lvl6pPr marL="2286000" indent="0">
               <a:buNone/>
-              <a:defRPr sz="1400">
+              <a:defRPr sz="1600">
                 <a:solidFill>
                   <a:schemeClr val="tx1">
                     <a:tint val="75000"/>
@@ -976,7 +959,7 @@
             </a:lvl6pPr>
             <a:lvl7pPr marL="2743200" indent="0">
               <a:buNone/>
-              <a:defRPr sz="1400">
+              <a:defRPr sz="1600">
                 <a:solidFill>
                   <a:schemeClr val="tx1">
                     <a:tint val="75000"/>
@@ -986,7 +969,7 @@
             </a:lvl7pPr>
             <a:lvl8pPr marL="3200400" indent="0">
               <a:buNone/>
-              <a:defRPr sz="1400">
+              <a:defRPr sz="1600">
                 <a:solidFill>
                   <a:schemeClr val="tx1">
                     <a:tint val="75000"/>
@@ -996,7 +979,7 @@
             </a:lvl8pPr>
             <a:lvl9pPr marL="3657600" indent="0">
               <a:buNone/>
-              <a:defRPr sz="1400">
+              <a:defRPr sz="1600">
                 <a:solidFill>
                   <a:schemeClr val="tx1">
                     <a:tint val="75000"/>
@@ -1016,7 +999,7 @@
       </p:sp>
       <p:sp>
         <p:nvSpPr>
-          <p:cNvPr id="4" name="Дата 3"/>
+          <p:cNvPr id="4" name="Date Placeholder 3"/>
           <p:cNvSpPr>
             <a:spLocks noGrp="1"/>
           </p:cNvSpPr>
@@ -1029,9 +1012,9 @@
           <a:bodyPr/>
           <a:lstStyle/>
           <a:p>
-            <a:fld id="{B4C71EC6-210F-42DE-9C53-41977AD35B3D}" type="datetimeFigureOut">
-              <a:rPr lang="ru-RU" smtClean="0"/>
-              <a:t>12.11.2009</a:t>
+            <a:fld id="{27FFA9D7-9CD8-41BC-B0CB-510313C07A99}" type="datetimeFigureOut">
+              <a:rPr lang="ru-RU" smtClean="0"/>
+              <a:t>14.06.2016</a:t>
             </a:fld>
             <a:endParaRPr lang="ru-RU"/>
           </a:p>
@@ -1039,7 +1022,7 @@
       </p:sp>
       <p:sp>
         <p:nvSpPr>
-          <p:cNvPr id="5" name="Нижний колонтитул 4"/>
+          <p:cNvPr id="5" name="Footer Placeholder 4"/>
           <p:cNvSpPr>
             <a:spLocks noGrp="1"/>
           </p:cNvSpPr>
@@ -1058,7 +1041,7 @@
       </p:sp>
       <p:sp>
         <p:nvSpPr>
-          <p:cNvPr id="6" name="Номер слайда 5"/>
+          <p:cNvPr id="6" name="Slide Number Placeholder 5"/>
           <p:cNvSpPr>
             <a:spLocks noGrp="1"/>
           </p:cNvSpPr>
@@ -1071,7 +1054,7 @@
           <a:bodyPr/>
           <a:lstStyle/>
           <a:p>
-            <a:fld id="{B19B0651-EE4F-4900-A07F-96A6BFA9D0F0}" type="slidenum">
+            <a:fld id="{AD077826-35F6-45AF-B5AB-3734735C3DD3}" type="slidenum">
               <a:rPr lang="ru-RU" smtClean="0"/>
               <a:t>‹#›</a:t>
             </a:fld>
@@ -1080,6 +1063,11 @@
         </p:txBody>
       </p:sp>
     </p:spTree>
+    <p:extLst>
+      <p:ext uri="{BB962C8B-B14F-4D97-AF65-F5344CB8AC3E}">
+        <p14:creationId xmlns:p14="http://schemas.microsoft.com/office/powerpoint/2010/main" val="1836324137"/>
+      </p:ext>
+    </p:extLst>
   </p:cSld>
   <p:clrMapOvr>
     <a:masterClrMapping/>
@@ -1106,7 +1094,7 @@
       </p:grpSpPr>
       <p:sp>
         <p:nvSpPr>
-          <p:cNvPr id="2" name="Заголовок 1"/>
+          <p:cNvPr id="2" name="Title 1"/>
           <p:cNvSpPr>
             <a:spLocks noGrp="1"/>
           </p:cNvSpPr>
@@ -1123,13 +1111,13 @@
               <a:rPr lang="ru-RU" smtClean="0"/>
               <a:t>Образец заголовка</a:t>
             </a:r>
-            <a:endParaRPr lang="ru-RU"/>
-          </a:p>
-        </p:txBody>
-      </p:sp>
-      <p:sp>
-        <p:nvSpPr>
-          <p:cNvPr id="3" name="Содержимое 2"/>
+            <a:endParaRPr lang="en-US" dirty="0"/>
+          </a:p>
+        </p:txBody>
+      </p:sp>
+      <p:sp>
+        <p:nvSpPr>
+          <p:cNvPr id="3" name="Content Placeholder 2"/>
           <p:cNvSpPr>
             <a:spLocks noGrp="1"/>
           </p:cNvSpPr>
@@ -1139,41 +1127,13 @@
         </p:nvSpPr>
         <p:spPr>
           <a:xfrm>
-            <a:off x="457200" y="1600200"/>
-            <a:ext cx="4038600" cy="4525963"/>
+            <a:off x="628650" y="1825625"/>
+            <a:ext cx="3886200" cy="4351338"/>
           </a:xfrm>
         </p:spPr>
         <p:txBody>
           <a:bodyPr/>
-          <a:lstStyle>
-            <a:lvl1pPr>
-              <a:defRPr sz="2800"/>
-            </a:lvl1pPr>
-            <a:lvl2pPr>
-              <a:defRPr sz="2400"/>
-            </a:lvl2pPr>
-            <a:lvl3pPr>
-              <a:defRPr sz="2000"/>
-            </a:lvl3pPr>
-            <a:lvl4pPr>
-              <a:defRPr sz="1800"/>
-            </a:lvl4pPr>
-            <a:lvl5pPr>
-              <a:defRPr sz="1800"/>
-            </a:lvl5pPr>
-            <a:lvl6pPr>
-              <a:defRPr sz="1800"/>
-            </a:lvl6pPr>
-            <a:lvl7pPr>
-              <a:defRPr sz="1800"/>
-            </a:lvl7pPr>
-            <a:lvl8pPr>
-              <a:defRPr sz="1800"/>
-            </a:lvl8pPr>
-            <a:lvl9pPr>
-              <a:defRPr sz="1800"/>
-            </a:lvl9pPr>
-          </a:lstStyle>
+          <a:lstStyle/>
           <a:p>
             <a:pPr lvl="0"/>
             <a:r>
@@ -1208,13 +1168,13 @@
               <a:rPr lang="ru-RU" smtClean="0"/>
               <a:t>Пятый уровень</a:t>
             </a:r>
-            <a:endParaRPr lang="ru-RU"/>
-          </a:p>
-        </p:txBody>
-      </p:sp>
-      <p:sp>
-        <p:nvSpPr>
-          <p:cNvPr id="4" name="Содержимое 3"/>
+            <a:endParaRPr lang="en-US" dirty="0"/>
+          </a:p>
+        </p:txBody>
+      </p:sp>
+      <p:sp>
+        <p:nvSpPr>
+          <p:cNvPr id="4" name="Content Placeholder 3"/>
           <p:cNvSpPr>
             <a:spLocks noGrp="1"/>
           </p:cNvSpPr>
@@ -1224,41 +1184,13 @@
         </p:nvSpPr>
         <p:spPr>
           <a:xfrm>
-            <a:off x="4648200" y="1600200"/>
-            <a:ext cx="4038600" cy="4525963"/>
+            <a:off x="4629150" y="1825625"/>
+            <a:ext cx="3886200" cy="4351338"/>
           </a:xfrm>
         </p:spPr>
         <p:txBody>
           <a:bodyPr/>
-          <a:lstStyle>
-            <a:lvl1pPr>
-              <a:defRPr sz="2800"/>
-            </a:lvl1pPr>
-            <a:lvl2pPr>
-              <a:defRPr sz="2400"/>
-            </a:lvl2pPr>
-            <a:lvl3pPr>
-              <a:defRPr sz="2000"/>
-            </a:lvl3pPr>
-            <a:lvl4pPr>
-              <a:defRPr sz="1800"/>
-            </a:lvl4pPr>
-            <a:lvl5pPr>
-              <a:defRPr sz="1800"/>
-            </a:lvl5pPr>
-            <a:lvl6pPr>
-              <a:defRPr sz="1800"/>
-            </a:lvl6pPr>
-            <a:lvl7pPr>
-              <a:defRPr sz="1800"/>
-            </a:lvl7pPr>
-            <a:lvl8pPr>
-              <a:defRPr sz="1800"/>
-            </a:lvl8pPr>
-            <a:lvl9pPr>
-              <a:defRPr sz="1800"/>
-            </a:lvl9pPr>
-          </a:lstStyle>
+          <a:lstStyle/>
           <a:p>
             <a:pPr lvl="0"/>
             <a:r>
@@ -1293,13 +1225,13 @@
               <a:rPr lang="ru-RU" smtClean="0"/>
               <a:t>Пятый уровень</a:t>
             </a:r>
-            <a:endParaRPr lang="ru-RU"/>
-          </a:p>
-        </p:txBody>
-      </p:sp>
-      <p:sp>
-        <p:nvSpPr>
-          <p:cNvPr id="5" name="Дата 4"/>
+            <a:endParaRPr lang="en-US" dirty="0"/>
+          </a:p>
+        </p:txBody>
+      </p:sp>
+      <p:sp>
+        <p:nvSpPr>
+          <p:cNvPr id="5" name="Date Placeholder 4"/>
           <p:cNvSpPr>
             <a:spLocks noGrp="1"/>
           </p:cNvSpPr>
@@ -1312,9 +1244,9 @@
           <a:bodyPr/>
           <a:lstStyle/>
           <a:p>
-            <a:fld id="{B4C71EC6-210F-42DE-9C53-41977AD35B3D}" type="datetimeFigureOut">
-              <a:rPr lang="ru-RU" smtClean="0"/>
-              <a:t>12.11.2009</a:t>
+            <a:fld id="{27FFA9D7-9CD8-41BC-B0CB-510313C07A99}" type="datetimeFigureOut">
+              <a:rPr lang="ru-RU" smtClean="0"/>
+              <a:t>14.06.2016</a:t>
             </a:fld>
             <a:endParaRPr lang="ru-RU"/>
           </a:p>
@@ -1322,7 +1254,7 @@
       </p:sp>
       <p:sp>
         <p:nvSpPr>
-          <p:cNvPr id="6" name="Нижний колонтитул 5"/>
+          <p:cNvPr id="6" name="Footer Placeholder 5"/>
           <p:cNvSpPr>
             <a:spLocks noGrp="1"/>
           </p:cNvSpPr>
@@ -1341,7 +1273,7 @@
       </p:sp>
       <p:sp>
         <p:nvSpPr>
-          <p:cNvPr id="7" name="Номер слайда 6"/>
+          <p:cNvPr id="7" name="Slide Number Placeholder 6"/>
           <p:cNvSpPr>
             <a:spLocks noGrp="1"/>
           </p:cNvSpPr>
@@ -1354,7 +1286,7 @@
           <a:bodyPr/>
           <a:lstStyle/>
           <a:p>
-            <a:fld id="{B19B0651-EE4F-4900-A07F-96A6BFA9D0F0}" type="slidenum">
+            <a:fld id="{AD077826-35F6-45AF-B5AB-3734735C3DD3}" type="slidenum">
               <a:rPr lang="ru-RU" smtClean="0"/>
               <a:t>‹#›</a:t>
             </a:fld>
@@ -1363,6 +1295,11 @@
         </p:txBody>
       </p:sp>
     </p:spTree>
+    <p:extLst>
+      <p:ext uri="{BB962C8B-B14F-4D97-AF65-F5344CB8AC3E}">
+        <p14:creationId xmlns:p14="http://schemas.microsoft.com/office/powerpoint/2010/main" val="3814268155"/>
+      </p:ext>
+    </p:extLst>
   </p:cSld>
   <p:clrMapOvr>
     <a:masterClrMapping/>
@@ -1389,45 +1326,46 @@
       </p:grpSpPr>
       <p:sp>
         <p:nvSpPr>
-          <p:cNvPr id="2" name="Заголовок 1"/>
+          <p:cNvPr id="2" name="Title 1"/>
           <p:cNvSpPr>
             <a:spLocks noGrp="1"/>
           </p:cNvSpPr>
           <p:nvPr>
             <p:ph type="title"/>
-          </p:nvPr>
-        </p:nvSpPr>
-        <p:spPr/>
-        <p:txBody>
-          <a:bodyPr/>
-          <a:lstStyle>
-            <a:lvl1pPr>
-              <a:defRPr/>
-            </a:lvl1pPr>
-          </a:lstStyle>
-          <a:p>
-            <a:r>
-              <a:rPr lang="ru-RU" smtClean="0"/>
-              <a:t>Образец заголовка</a:t>
-            </a:r>
-            <a:endParaRPr lang="ru-RU"/>
-          </a:p>
-        </p:txBody>
-      </p:sp>
-      <p:sp>
-        <p:nvSpPr>
-          <p:cNvPr id="3" name="Текст 2"/>
-          <p:cNvSpPr>
-            <a:spLocks noGrp="1"/>
-          </p:cNvSpPr>
-          <p:nvPr>
-            <p:ph type="body" idx="1"/>
           </p:nvPr>
         </p:nvSpPr>
         <p:spPr>
           <a:xfrm>
-            <a:off x="457200" y="1535113"/>
-            <a:ext cx="4040188" cy="639762"/>
+            <a:off x="629841" y="365126"/>
+            <a:ext cx="7886700" cy="1325563"/>
+          </a:xfrm>
+        </p:spPr>
+        <p:txBody>
+          <a:bodyPr/>
+          <a:lstStyle/>
+          <a:p>
+            <a:r>
+              <a:rPr lang="ru-RU" smtClean="0"/>
+              <a:t>Образец заголовка</a:t>
+            </a:r>
+            <a:endParaRPr lang="en-US" dirty="0"/>
+          </a:p>
+        </p:txBody>
+      </p:sp>
+      <p:sp>
+        <p:nvSpPr>
+          <p:cNvPr id="3" name="Text Placeholder 2"/>
+          <p:cNvSpPr>
+            <a:spLocks noGrp="1"/>
+          </p:cNvSpPr>
+          <p:nvPr>
+            <p:ph type="body" idx="1"/>
+          </p:nvPr>
+        </p:nvSpPr>
+        <p:spPr>
+          <a:xfrm>
+            <a:off x="629842" y="1681163"/>
+            <a:ext cx="3868340" cy="823912"/>
           </a:xfrm>
         </p:spPr>
         <p:txBody>
@@ -1481,7 +1419,7 @@
       </p:sp>
       <p:sp>
         <p:nvSpPr>
-          <p:cNvPr id="4" name="Содержимое 3"/>
+          <p:cNvPr id="4" name="Content Placeholder 3"/>
           <p:cNvSpPr>
             <a:spLocks noGrp="1"/>
           </p:cNvSpPr>
@@ -1491,41 +1429,13 @@
         </p:nvSpPr>
         <p:spPr>
           <a:xfrm>
-            <a:off x="457200" y="2174875"/>
-            <a:ext cx="4040188" cy="3951288"/>
+            <a:off x="629842" y="2505075"/>
+            <a:ext cx="3868340" cy="3684588"/>
           </a:xfrm>
         </p:spPr>
         <p:txBody>
           <a:bodyPr/>
-          <a:lstStyle>
-            <a:lvl1pPr>
-              <a:defRPr sz="2400"/>
-            </a:lvl1pPr>
-            <a:lvl2pPr>
-              <a:defRPr sz="2000"/>
-            </a:lvl2pPr>
-            <a:lvl3pPr>
-              <a:defRPr sz="1800"/>
-            </a:lvl3pPr>
-            <a:lvl4pPr>
-              <a:defRPr sz="1600"/>
-            </a:lvl4pPr>
-            <a:lvl5pPr>
-              <a:defRPr sz="1600"/>
-            </a:lvl5pPr>
-            <a:lvl6pPr>
-              <a:defRPr sz="1600"/>
-            </a:lvl6pPr>
-            <a:lvl7pPr>
-              <a:defRPr sz="1600"/>
-            </a:lvl7pPr>
-            <a:lvl8pPr>
-              <a:defRPr sz="1600"/>
-            </a:lvl8pPr>
-            <a:lvl9pPr>
-              <a:defRPr sz="1600"/>
-            </a:lvl9pPr>
-          </a:lstStyle>
+          <a:lstStyle/>
           <a:p>
             <a:pPr lvl="0"/>
             <a:r>
@@ -1560,13 +1470,13 @@
               <a:rPr lang="ru-RU" smtClean="0"/>
               <a:t>Пятый уровень</a:t>
             </a:r>
-            <a:endParaRPr lang="ru-RU"/>
-          </a:p>
-        </p:txBody>
-      </p:sp>
-      <p:sp>
-        <p:nvSpPr>
-          <p:cNvPr id="5" name="Текст 4"/>
+            <a:endParaRPr lang="en-US" dirty="0"/>
+          </a:p>
+        </p:txBody>
+      </p:sp>
+      <p:sp>
+        <p:nvSpPr>
+          <p:cNvPr id="5" name="Text Placeholder 4"/>
           <p:cNvSpPr>
             <a:spLocks noGrp="1"/>
           </p:cNvSpPr>
@@ -1576,8 +1486,8 @@
         </p:nvSpPr>
         <p:spPr>
           <a:xfrm>
-            <a:off x="4645025" y="1535113"/>
-            <a:ext cx="4041775" cy="639762"/>
+            <a:off x="4629150" y="1681163"/>
+            <a:ext cx="3887391" cy="823912"/>
           </a:xfrm>
         </p:spPr>
         <p:txBody>
@@ -1631,7 +1541,7 @@
       </p:sp>
       <p:sp>
         <p:nvSpPr>
-          <p:cNvPr id="6" name="Содержимое 5"/>
+          <p:cNvPr id="6" name="Content Placeholder 5"/>
           <p:cNvSpPr>
             <a:spLocks noGrp="1"/>
           </p:cNvSpPr>
@@ -1641,41 +1551,13 @@
         </p:nvSpPr>
         <p:spPr>
           <a:xfrm>
-            <a:off x="4645025" y="2174875"/>
-            <a:ext cx="4041775" cy="3951288"/>
+            <a:off x="4629150" y="2505075"/>
+            <a:ext cx="3887391" cy="3684588"/>
           </a:xfrm>
         </p:spPr>
         <p:txBody>
           <a:bodyPr/>
-          <a:lstStyle>
-            <a:lvl1pPr>
-              <a:defRPr sz="2400"/>
-            </a:lvl1pPr>
-            <a:lvl2pPr>
-              <a:defRPr sz="2000"/>
-            </a:lvl2pPr>
-            <a:lvl3pPr>
-              <a:defRPr sz="1800"/>
-            </a:lvl3pPr>
-            <a:lvl4pPr>
-              <a:defRPr sz="1600"/>
-            </a:lvl4pPr>
-            <a:lvl5pPr>
-              <a:defRPr sz="1600"/>
-            </a:lvl5pPr>
-            <a:lvl6pPr>
-              <a:defRPr sz="1600"/>
-            </a:lvl6pPr>
-            <a:lvl7pPr>
-              <a:defRPr sz="1600"/>
-            </a:lvl7pPr>
-            <a:lvl8pPr>
-              <a:defRPr sz="1600"/>
-            </a:lvl8pPr>
-            <a:lvl9pPr>
-              <a:defRPr sz="1600"/>
-            </a:lvl9pPr>
-          </a:lstStyle>
+          <a:lstStyle/>
           <a:p>
             <a:pPr lvl="0"/>
             <a:r>
@@ -1710,13 +1592,13 @@
               <a:rPr lang="ru-RU" smtClean="0"/>
               <a:t>Пятый уровень</a:t>
             </a:r>
-            <a:endParaRPr lang="ru-RU"/>
-          </a:p>
-        </p:txBody>
-      </p:sp>
-      <p:sp>
-        <p:nvSpPr>
-          <p:cNvPr id="7" name="Дата 6"/>
+            <a:endParaRPr lang="en-US" dirty="0"/>
+          </a:p>
+        </p:txBody>
+      </p:sp>
+      <p:sp>
+        <p:nvSpPr>
+          <p:cNvPr id="7" name="Date Placeholder 6"/>
           <p:cNvSpPr>
             <a:spLocks noGrp="1"/>
           </p:cNvSpPr>
@@ -1729,9 +1611,9 @@
           <a:bodyPr/>
           <a:lstStyle/>
           <a:p>
-            <a:fld id="{B4C71EC6-210F-42DE-9C53-41977AD35B3D}" type="datetimeFigureOut">
-              <a:rPr lang="ru-RU" smtClean="0"/>
-              <a:t>12.11.2009</a:t>
+            <a:fld id="{27FFA9D7-9CD8-41BC-B0CB-510313C07A99}" type="datetimeFigureOut">
+              <a:rPr lang="ru-RU" smtClean="0"/>
+              <a:t>14.06.2016</a:t>
             </a:fld>
             <a:endParaRPr lang="ru-RU"/>
           </a:p>
@@ -1739,7 +1621,7 @@
       </p:sp>
       <p:sp>
         <p:nvSpPr>
-          <p:cNvPr id="8" name="Нижний колонтитул 7"/>
+          <p:cNvPr id="8" name="Footer Placeholder 7"/>
           <p:cNvSpPr>
             <a:spLocks noGrp="1"/>
           </p:cNvSpPr>
@@ -1758,7 +1640,7 @@
       </p:sp>
       <p:sp>
         <p:nvSpPr>
-          <p:cNvPr id="9" name="Номер слайда 8"/>
+          <p:cNvPr id="9" name="Slide Number Placeholder 8"/>
           <p:cNvSpPr>
             <a:spLocks noGrp="1"/>
           </p:cNvSpPr>
@@ -1771,7 +1653,7 @@
           <a:bodyPr/>
           <a:lstStyle/>
           <a:p>
-            <a:fld id="{B19B0651-EE4F-4900-A07F-96A6BFA9D0F0}" type="slidenum">
+            <a:fld id="{AD077826-35F6-45AF-B5AB-3734735C3DD3}" type="slidenum">
               <a:rPr lang="ru-RU" smtClean="0"/>
               <a:t>‹#›</a:t>
             </a:fld>
@@ -1780,6 +1662,11 @@
         </p:txBody>
       </p:sp>
     </p:spTree>
+    <p:extLst>
+      <p:ext uri="{BB962C8B-B14F-4D97-AF65-F5344CB8AC3E}">
+        <p14:creationId xmlns:p14="http://schemas.microsoft.com/office/powerpoint/2010/main" val="3999101033"/>
+      </p:ext>
+    </p:extLst>
   </p:cSld>
   <p:clrMapOvr>
     <a:masterClrMapping/>
@@ -1806,7 +1693,7 @@
       </p:grpSpPr>
       <p:sp>
         <p:nvSpPr>
-          <p:cNvPr id="2" name="Заголовок 1"/>
+          <p:cNvPr id="2" name="Title 1"/>
           <p:cNvSpPr>
             <a:spLocks noGrp="1"/>
           </p:cNvSpPr>
@@ -1823,13 +1710,13 @@
               <a:rPr lang="ru-RU" smtClean="0"/>
               <a:t>Образец заголовка</a:t>
             </a:r>
-            <a:endParaRPr lang="ru-RU"/>
-          </a:p>
-        </p:txBody>
-      </p:sp>
-      <p:sp>
-        <p:nvSpPr>
-          <p:cNvPr id="3" name="Дата 2"/>
+            <a:endParaRPr lang="en-US" dirty="0"/>
+          </a:p>
+        </p:txBody>
+      </p:sp>
+      <p:sp>
+        <p:nvSpPr>
+          <p:cNvPr id="3" name="Date Placeholder 2"/>
           <p:cNvSpPr>
             <a:spLocks noGrp="1"/>
           </p:cNvSpPr>
@@ -1842,9 +1729,9 @@
           <a:bodyPr/>
           <a:lstStyle/>
           <a:p>
-            <a:fld id="{B4C71EC6-210F-42DE-9C53-41977AD35B3D}" type="datetimeFigureOut">
-              <a:rPr lang="ru-RU" smtClean="0"/>
-              <a:t>12.11.2009</a:t>
+            <a:fld id="{27FFA9D7-9CD8-41BC-B0CB-510313C07A99}" type="datetimeFigureOut">
+              <a:rPr lang="ru-RU" smtClean="0"/>
+              <a:t>14.06.2016</a:t>
             </a:fld>
             <a:endParaRPr lang="ru-RU"/>
           </a:p>
@@ -1852,7 +1739,7 @@
       </p:sp>
       <p:sp>
         <p:nvSpPr>
-          <p:cNvPr id="4" name="Нижний колонтитул 3"/>
+          <p:cNvPr id="4" name="Footer Placeholder 3"/>
           <p:cNvSpPr>
             <a:spLocks noGrp="1"/>
           </p:cNvSpPr>
@@ -1871,7 +1758,7 @@
       </p:sp>
       <p:sp>
         <p:nvSpPr>
-          <p:cNvPr id="5" name="Номер слайда 4"/>
+          <p:cNvPr id="5" name="Slide Number Placeholder 4"/>
           <p:cNvSpPr>
             <a:spLocks noGrp="1"/>
           </p:cNvSpPr>
@@ -1884,7 +1771,7 @@
           <a:bodyPr/>
           <a:lstStyle/>
           <a:p>
-            <a:fld id="{B19B0651-EE4F-4900-A07F-96A6BFA9D0F0}" type="slidenum">
+            <a:fld id="{AD077826-35F6-45AF-B5AB-3734735C3DD3}" type="slidenum">
               <a:rPr lang="ru-RU" smtClean="0"/>
               <a:t>‹#›</a:t>
             </a:fld>
@@ -1893,6 +1780,11 @@
         </p:txBody>
       </p:sp>
     </p:spTree>
+    <p:extLst>
+      <p:ext uri="{BB962C8B-B14F-4D97-AF65-F5344CB8AC3E}">
+        <p14:creationId xmlns:p14="http://schemas.microsoft.com/office/powerpoint/2010/main" val="3718208582"/>
+      </p:ext>
+    </p:extLst>
   </p:cSld>
   <p:clrMapOvr>
     <a:masterClrMapping/>
@@ -1919,7 +1811,7 @@
       </p:grpSpPr>
       <p:sp>
         <p:nvSpPr>
-          <p:cNvPr id="2" name="Дата 1"/>
+          <p:cNvPr id="2" name="Date Placeholder 1"/>
           <p:cNvSpPr>
             <a:spLocks noGrp="1"/>
           </p:cNvSpPr>
@@ -1932,9 +1824,9 @@
           <a:bodyPr/>
           <a:lstStyle/>
           <a:p>
-            <a:fld id="{B4C71EC6-210F-42DE-9C53-41977AD35B3D}" type="datetimeFigureOut">
-              <a:rPr lang="ru-RU" smtClean="0"/>
-              <a:t>12.11.2009</a:t>
+            <a:fld id="{27FFA9D7-9CD8-41BC-B0CB-510313C07A99}" type="datetimeFigureOut">
+              <a:rPr lang="ru-RU" smtClean="0"/>
+              <a:t>14.06.2016</a:t>
             </a:fld>
             <a:endParaRPr lang="ru-RU"/>
           </a:p>
@@ -1942,7 +1834,7 @@
       </p:sp>
       <p:sp>
         <p:nvSpPr>
-          <p:cNvPr id="3" name="Нижний колонтитул 2"/>
+          <p:cNvPr id="3" name="Footer Placeholder 2"/>
           <p:cNvSpPr>
             <a:spLocks noGrp="1"/>
           </p:cNvSpPr>
@@ -1961,7 +1853,7 @@
       </p:sp>
       <p:sp>
         <p:nvSpPr>
-          <p:cNvPr id="4" name="Номер слайда 3"/>
+          <p:cNvPr id="4" name="Slide Number Placeholder 3"/>
           <p:cNvSpPr>
             <a:spLocks noGrp="1"/>
           </p:cNvSpPr>
@@ -1974,7 +1866,7 @@
           <a:bodyPr/>
           <a:lstStyle/>
           <a:p>
-            <a:fld id="{B19B0651-EE4F-4900-A07F-96A6BFA9D0F0}" type="slidenum">
+            <a:fld id="{AD077826-35F6-45AF-B5AB-3734735C3DD3}" type="slidenum">
               <a:rPr lang="ru-RU" smtClean="0"/>
               <a:t>‹#›</a:t>
             </a:fld>
@@ -1983,6 +1875,11 @@
         </p:txBody>
       </p:sp>
     </p:spTree>
+    <p:extLst>
+      <p:ext uri="{BB962C8B-B14F-4D97-AF65-F5344CB8AC3E}">
+        <p14:creationId xmlns:p14="http://schemas.microsoft.com/office/powerpoint/2010/main" val="4042515888"/>
+      </p:ext>
+    </p:extLst>
   </p:cSld>
   <p:clrMapOvr>
     <a:masterClrMapping/>
@@ -2009,7 +1906,7 @@
       </p:grpSpPr>
       <p:sp>
         <p:nvSpPr>
-          <p:cNvPr id="2" name="Заголовок 1"/>
+          <p:cNvPr id="2" name="Title 1"/>
           <p:cNvSpPr>
             <a:spLocks noGrp="1"/>
           </p:cNvSpPr>
@@ -2019,15 +1916,15 @@
         </p:nvSpPr>
         <p:spPr>
           <a:xfrm>
-            <a:off x="457200" y="273050"/>
-            <a:ext cx="3008313" cy="1162050"/>
+            <a:off x="629841" y="457200"/>
+            <a:ext cx="2949178" cy="1600200"/>
           </a:xfrm>
         </p:spPr>
         <p:txBody>
           <a:bodyPr anchor="b"/>
           <a:lstStyle>
-            <a:lvl1pPr algn="l">
-              <a:defRPr sz="2000" b="1"/>
+            <a:lvl1pPr>
+              <a:defRPr sz="3200"/>
             </a:lvl1pPr>
           </a:lstStyle>
           <a:p>
@@ -2035,13 +1932,13 @@
               <a:rPr lang="ru-RU" smtClean="0"/>
               <a:t>Образец заголовка</a:t>
             </a:r>
-            <a:endParaRPr lang="ru-RU"/>
-          </a:p>
-        </p:txBody>
-      </p:sp>
-      <p:sp>
-        <p:nvSpPr>
-          <p:cNvPr id="3" name="Содержимое 2"/>
+            <a:endParaRPr lang="en-US" dirty="0"/>
+          </a:p>
+        </p:txBody>
+      </p:sp>
+      <p:sp>
+        <p:nvSpPr>
+          <p:cNvPr id="3" name="Content Placeholder 2"/>
           <p:cNvSpPr>
             <a:spLocks noGrp="1"/>
           </p:cNvSpPr>
@@ -2051,8 +1948,8 @@
         </p:nvSpPr>
         <p:spPr>
           <a:xfrm>
-            <a:off x="3575050" y="273050"/>
-            <a:ext cx="5111750" cy="5853113"/>
+            <a:off x="3887391" y="987426"/>
+            <a:ext cx="4629150" cy="4873625"/>
           </a:xfrm>
         </p:spPr>
         <p:txBody>
@@ -2120,13 +2017,13 @@
               <a:rPr lang="ru-RU" smtClean="0"/>
               <a:t>Пятый уровень</a:t>
             </a:r>
-            <a:endParaRPr lang="ru-RU"/>
-          </a:p>
-        </p:txBody>
-      </p:sp>
-      <p:sp>
-        <p:nvSpPr>
-          <p:cNvPr id="4" name="Текст 3"/>
+            <a:endParaRPr lang="en-US" dirty="0"/>
+          </a:p>
+        </p:txBody>
+      </p:sp>
+      <p:sp>
+        <p:nvSpPr>
+          <p:cNvPr id="4" name="Text Placeholder 3"/>
           <p:cNvSpPr>
             <a:spLocks noGrp="1"/>
           </p:cNvSpPr>
@@ -2136,8 +2033,8 @@
         </p:nvSpPr>
         <p:spPr>
           <a:xfrm>
-            <a:off x="457200" y="1435100"/>
-            <a:ext cx="3008313" cy="4691063"/>
+            <a:off x="629841" y="2057400"/>
+            <a:ext cx="2949178" cy="3811588"/>
           </a:xfrm>
         </p:spPr>
         <p:txBody>
@@ -2145,39 +2042,39 @@
           <a:lstStyle>
             <a:lvl1pPr marL="0" indent="0">
               <a:buNone/>
-              <a:defRPr sz="1400"/>
+              <a:defRPr sz="1600"/>
             </a:lvl1pPr>
             <a:lvl2pPr marL="457200" indent="0">
               <a:buNone/>
-              <a:defRPr sz="1200"/>
+              <a:defRPr sz="1400"/>
             </a:lvl2pPr>
             <a:lvl3pPr marL="914400" indent="0">
               <a:buNone/>
-              <a:defRPr sz="1000"/>
+              <a:defRPr sz="1200"/>
             </a:lvl3pPr>
             <a:lvl4pPr marL="1371600" indent="0">
               <a:buNone/>
-              <a:defRPr sz="900"/>
+              <a:defRPr sz="1000"/>
             </a:lvl4pPr>
             <a:lvl5pPr marL="1828800" indent="0">
               <a:buNone/>
-              <a:defRPr sz="900"/>
+              <a:defRPr sz="1000"/>
             </a:lvl5pPr>
             <a:lvl6pPr marL="2286000" indent="0">
               <a:buNone/>
-              <a:defRPr sz="900"/>
+              <a:defRPr sz="1000"/>
             </a:lvl6pPr>
             <a:lvl7pPr marL="2743200" indent="0">
               <a:buNone/>
-              <a:defRPr sz="900"/>
+              <a:defRPr sz="1000"/>
             </a:lvl7pPr>
             <a:lvl8pPr marL="3200400" indent="0">
               <a:buNone/>
-              <a:defRPr sz="900"/>
+              <a:defRPr sz="1000"/>
             </a:lvl8pPr>
             <a:lvl9pPr marL="3657600" indent="0">
               <a:buNone/>
-              <a:defRPr sz="900"/>
+              <a:defRPr sz="1000"/>
             </a:lvl9pPr>
           </a:lstStyle>
           <a:p>
@@ -2191,7 +2088,7 @@
       </p:sp>
       <p:sp>
         <p:nvSpPr>
-          <p:cNvPr id="5" name="Дата 4"/>
+          <p:cNvPr id="5" name="Date Placeholder 4"/>
           <p:cNvSpPr>
             <a:spLocks noGrp="1"/>
           </p:cNvSpPr>
@@ -2204,9 +2101,9 @@
           <a:bodyPr/>
           <a:lstStyle/>
           <a:p>
-            <a:fld id="{B4C71EC6-210F-42DE-9C53-41977AD35B3D}" type="datetimeFigureOut">
-              <a:rPr lang="ru-RU" smtClean="0"/>
-              <a:t>12.11.2009</a:t>
+            <a:fld id="{27FFA9D7-9CD8-41BC-B0CB-510313C07A99}" type="datetimeFigureOut">
+              <a:rPr lang="ru-RU" smtClean="0"/>
+              <a:t>14.06.2016</a:t>
             </a:fld>
             <a:endParaRPr lang="ru-RU"/>
           </a:p>
@@ -2214,7 +2111,7 @@
       </p:sp>
       <p:sp>
         <p:nvSpPr>
-          <p:cNvPr id="6" name="Нижний колонтитул 5"/>
+          <p:cNvPr id="6" name="Footer Placeholder 5"/>
           <p:cNvSpPr>
             <a:spLocks noGrp="1"/>
           </p:cNvSpPr>
@@ -2233,7 +2130,7 @@
       </p:sp>
       <p:sp>
         <p:nvSpPr>
-          <p:cNvPr id="7" name="Номер слайда 6"/>
+          <p:cNvPr id="7" name="Slide Number Placeholder 6"/>
           <p:cNvSpPr>
             <a:spLocks noGrp="1"/>
           </p:cNvSpPr>
@@ -2246,7 +2143,7 @@
           <a:bodyPr/>
           <a:lstStyle/>
           <a:p>
-            <a:fld id="{B19B0651-EE4F-4900-A07F-96A6BFA9D0F0}" type="slidenum">
+            <a:fld id="{AD077826-35F6-45AF-B5AB-3734735C3DD3}" type="slidenum">
               <a:rPr lang="ru-RU" smtClean="0"/>
               <a:t>‹#›</a:t>
             </a:fld>
@@ -2255,6 +2152,11 @@
         </p:txBody>
       </p:sp>
     </p:spTree>
+    <p:extLst>
+      <p:ext uri="{BB962C8B-B14F-4D97-AF65-F5344CB8AC3E}">
+        <p14:creationId xmlns:p14="http://schemas.microsoft.com/office/powerpoint/2010/main" val="2655881044"/>
+      </p:ext>
+    </p:extLst>
   </p:cSld>
   <p:clrMapOvr>
     <a:masterClrMapping/>
@@ -2281,7 +2183,7 @@
       </p:grpSpPr>
       <p:sp>
         <p:nvSpPr>
-          <p:cNvPr id="2" name="Заголовок 1"/>
+          <p:cNvPr id="2" name="Title 1"/>
           <p:cNvSpPr>
             <a:spLocks noGrp="1"/>
           </p:cNvSpPr>
@@ -2291,15 +2193,15 @@
         </p:nvSpPr>
         <p:spPr>
           <a:xfrm>
-            <a:off x="1792288" y="4800600"/>
-            <a:ext cx="5486400" cy="566738"/>
+            <a:off x="629841" y="457200"/>
+            <a:ext cx="2949178" cy="1600200"/>
           </a:xfrm>
         </p:spPr>
         <p:txBody>
           <a:bodyPr anchor="b"/>
           <a:lstStyle>
-            <a:lvl1pPr algn="l">
-              <a:defRPr sz="2000" b="1"/>
+            <a:lvl1pPr>
+              <a:defRPr sz="3200"/>
             </a:lvl1pPr>
           </a:lstStyle>
           <a:p>
@@ -2307,15 +2209,15 @@
               <a:rPr lang="ru-RU" smtClean="0"/>
               <a:t>Образец заголовка</a:t>
             </a:r>
-            <a:endParaRPr lang="ru-RU"/>
-          </a:p>
-        </p:txBody>
-      </p:sp>
-      <p:sp>
-        <p:nvSpPr>
-          <p:cNvPr id="3" name="Рисунок 2"/>
-          <p:cNvSpPr>
-            <a:spLocks noGrp="1"/>
+            <a:endParaRPr lang="en-US" dirty="0"/>
+          </a:p>
+        </p:txBody>
+      </p:sp>
+      <p:sp>
+        <p:nvSpPr>
+          <p:cNvPr id="3" name="Picture Placeholder 2"/>
+          <p:cNvSpPr>
+            <a:spLocks noGrp="1" noChangeAspect="1"/>
           </p:cNvSpPr>
           <p:nvPr>
             <p:ph type="pic" idx="1"/>
@@ -2323,12 +2225,12 @@
         </p:nvSpPr>
         <p:spPr>
           <a:xfrm>
-            <a:off x="1792288" y="612775"/>
-            <a:ext cx="5486400" cy="4114800"/>
+            <a:off x="3887391" y="987426"/>
+            <a:ext cx="4629150" cy="4873625"/>
           </a:xfrm>
         </p:spPr>
         <p:txBody>
-          <a:bodyPr/>
+          <a:bodyPr anchor="t"/>
           <a:lstStyle>
             <a:lvl1pPr marL="0" indent="0">
               <a:buNone/>
@@ -2368,13 +2270,17 @@
             </a:lvl9pPr>
           </a:lstStyle>
           <a:p>
-            <a:endParaRPr lang="ru-RU"/>
-          </a:p>
-        </p:txBody>
-      </p:sp>
-      <p:sp>
-        <p:nvSpPr>
-          <p:cNvPr id="4" name="Текст 3"/>
+            <a:r>
+              <a:rPr lang="ru-RU" smtClean="0"/>
+              <a:t>Вставка рисунка</a:t>
+            </a:r>
+            <a:endParaRPr lang="en-US" dirty="0"/>
+          </a:p>
+        </p:txBody>
+      </p:sp>
+      <p:sp>
+        <p:nvSpPr>
+          <p:cNvPr id="4" name="Text Placeholder 3"/>
           <p:cNvSpPr>
             <a:spLocks noGrp="1"/>
           </p:cNvSpPr>
@@ -2384,8 +2290,8 @@
         </p:nvSpPr>
         <p:spPr>
           <a:xfrm>
-            <a:off x="1792288" y="5367338"/>
-            <a:ext cx="5486400" cy="804862"/>
+            <a:off x="629841" y="2057400"/>
+            <a:ext cx="2949178" cy="3811588"/>
           </a:xfrm>
         </p:spPr>
         <p:txBody>
@@ -2393,39 +2299,39 @@
           <a:lstStyle>
             <a:lvl1pPr marL="0" indent="0">
               <a:buNone/>
-              <a:defRPr sz="1400"/>
+              <a:defRPr sz="1600"/>
             </a:lvl1pPr>
             <a:lvl2pPr marL="457200" indent="0">
               <a:buNone/>
-              <a:defRPr sz="1200"/>
+              <a:defRPr sz="1400"/>
             </a:lvl2pPr>
             <a:lvl3pPr marL="914400" indent="0">
               <a:buNone/>
-              <a:defRPr sz="1000"/>
+              <a:defRPr sz="1200"/>
             </a:lvl3pPr>
             <a:lvl4pPr marL="1371600" indent="0">
               <a:buNone/>
-              <a:defRPr sz="900"/>
+              <a:defRPr sz="1000"/>
             </a:lvl4pPr>
             <a:lvl5pPr marL="1828800" indent="0">
               <a:buNone/>
-              <a:defRPr sz="900"/>
+              <a:defRPr sz="1000"/>
             </a:lvl5pPr>
             <a:lvl6pPr marL="2286000" indent="0">
               <a:buNone/>
-              <a:defRPr sz="900"/>
+              <a:defRPr sz="1000"/>
             </a:lvl6pPr>
             <a:lvl7pPr marL="2743200" indent="0">
               <a:buNone/>
-              <a:defRPr sz="900"/>
+              <a:defRPr sz="1000"/>
             </a:lvl7pPr>
             <a:lvl8pPr marL="3200400" indent="0">
               <a:buNone/>
-              <a:defRPr sz="900"/>
+              <a:defRPr sz="1000"/>
             </a:lvl8pPr>
             <a:lvl9pPr marL="3657600" indent="0">
               <a:buNone/>
-              <a:defRPr sz="900"/>
+              <a:defRPr sz="1000"/>
             </a:lvl9pPr>
           </a:lstStyle>
           <a:p>
@@ -2439,7 +2345,7 @@
       </p:sp>
       <p:sp>
         <p:nvSpPr>
-          <p:cNvPr id="5" name="Дата 4"/>
+          <p:cNvPr id="5" name="Date Placeholder 4"/>
           <p:cNvSpPr>
             <a:spLocks noGrp="1"/>
           </p:cNvSpPr>
@@ -2452,9 +2358,9 @@
           <a:bodyPr/>
           <a:lstStyle/>
           <a:p>
-            <a:fld id="{B4C71EC6-210F-42DE-9C53-41977AD35B3D}" type="datetimeFigureOut">
-              <a:rPr lang="ru-RU" smtClean="0"/>
-              <a:t>12.11.2009</a:t>
+            <a:fld id="{27FFA9D7-9CD8-41BC-B0CB-510313C07A99}" type="datetimeFigureOut">
+              <a:rPr lang="ru-RU" smtClean="0"/>
+              <a:t>14.06.2016</a:t>
             </a:fld>
             <a:endParaRPr lang="ru-RU"/>
           </a:p>
@@ -2462,7 +2368,7 @@
       </p:sp>
       <p:sp>
         <p:nvSpPr>
-          <p:cNvPr id="6" name="Нижний колонтитул 5"/>
+          <p:cNvPr id="6" name="Footer Placeholder 5"/>
           <p:cNvSpPr>
             <a:spLocks noGrp="1"/>
           </p:cNvSpPr>
@@ -2481,7 +2387,7 @@
       </p:sp>
       <p:sp>
         <p:nvSpPr>
-          <p:cNvPr id="7" name="Номер слайда 6"/>
+          <p:cNvPr id="7" name="Slide Number Placeholder 6"/>
           <p:cNvSpPr>
             <a:spLocks noGrp="1"/>
           </p:cNvSpPr>
@@ -2494,7 +2400,7 @@
           <a:bodyPr/>
           <a:lstStyle/>
           <a:p>
-            <a:fld id="{B19B0651-EE4F-4900-A07F-96A6BFA9D0F0}" type="slidenum">
+            <a:fld id="{AD077826-35F6-45AF-B5AB-3734735C3DD3}" type="slidenum">
               <a:rPr lang="ru-RU" smtClean="0"/>
               <a:t>‹#›</a:t>
             </a:fld>
@@ -2503,6 +2409,11 @@
         </p:txBody>
       </p:sp>
     </p:spTree>
+    <p:extLst>
+      <p:ext uri="{BB962C8B-B14F-4D97-AF65-F5344CB8AC3E}">
+        <p14:creationId xmlns:p14="http://schemas.microsoft.com/office/powerpoint/2010/main" val="1424091518"/>
+      </p:ext>
+    </p:extLst>
   </p:cSld>
   <p:clrMapOvr>
     <a:masterClrMapping/>
@@ -2534,7 +2445,7 @@
       </p:grpSpPr>
       <p:sp>
         <p:nvSpPr>
-          <p:cNvPr id="2" name="Заголовок 1"/>
+          <p:cNvPr id="2" name="Title Placeholder 1"/>
           <p:cNvSpPr>
             <a:spLocks noGrp="1"/>
           </p:cNvSpPr>
@@ -2544,8 +2455,8 @@
         </p:nvSpPr>
         <p:spPr>
           <a:xfrm>
-            <a:off x="457200" y="274638"/>
-            <a:ext cx="8229600" cy="1143000"/>
+            <a:off x="628650" y="365126"/>
+            <a:ext cx="7886700" cy="1325563"/>
           </a:xfrm>
           <a:prstGeom prst="rect">
             <a:avLst/>
@@ -2561,13 +2472,13 @@
               <a:rPr lang="ru-RU" smtClean="0"/>
               <a:t>Образец заголовка</a:t>
             </a:r>
-            <a:endParaRPr lang="ru-RU"/>
-          </a:p>
-        </p:txBody>
-      </p:sp>
-      <p:sp>
-        <p:nvSpPr>
-          <p:cNvPr id="3" name="Текст 2"/>
+            <a:endParaRPr lang="en-US" dirty="0"/>
+          </a:p>
+        </p:txBody>
+      </p:sp>
+      <p:sp>
+        <p:nvSpPr>
+          <p:cNvPr id="3" name="Text Placeholder 2"/>
           <p:cNvSpPr>
             <a:spLocks noGrp="1"/>
           </p:cNvSpPr>
@@ -2577,8 +2488,8 @@
         </p:nvSpPr>
         <p:spPr>
           <a:xfrm>
-            <a:off x="457200" y="1600200"/>
-            <a:ext cx="8229600" cy="4525963"/>
+            <a:off x="628650" y="1825625"/>
+            <a:ext cx="7886700" cy="4351338"/>
           </a:xfrm>
           <a:prstGeom prst="rect">
             <a:avLst/>
@@ -2623,13 +2534,13 @@
               <a:rPr lang="ru-RU" smtClean="0"/>
               <a:t>Пятый уровень</a:t>
             </a:r>
-            <a:endParaRPr lang="ru-RU"/>
-          </a:p>
-        </p:txBody>
-      </p:sp>
-      <p:sp>
-        <p:nvSpPr>
-          <p:cNvPr id="4" name="Дата 3"/>
+            <a:endParaRPr lang="en-US" dirty="0"/>
+          </a:p>
+        </p:txBody>
+      </p:sp>
+      <p:sp>
+        <p:nvSpPr>
+          <p:cNvPr id="4" name="Date Placeholder 3"/>
           <p:cNvSpPr>
             <a:spLocks noGrp="1"/>
           </p:cNvSpPr>
@@ -2639,8 +2550,8 @@
         </p:nvSpPr>
         <p:spPr>
           <a:xfrm>
-            <a:off x="457200" y="6356350"/>
-            <a:ext cx="2133600" cy="365125"/>
+            <a:off x="628650" y="6356351"/>
+            <a:ext cx="2057400" cy="365125"/>
           </a:xfrm>
           <a:prstGeom prst="rect">
             <a:avLst/>
@@ -2660,9 +2571,9 @@
             </a:lvl1pPr>
           </a:lstStyle>
           <a:p>
-            <a:fld id="{B4C71EC6-210F-42DE-9C53-41977AD35B3D}" type="datetimeFigureOut">
-              <a:rPr lang="ru-RU" smtClean="0"/>
-              <a:t>12.11.2009</a:t>
+            <a:fld id="{27FFA9D7-9CD8-41BC-B0CB-510313C07A99}" type="datetimeFigureOut">
+              <a:rPr lang="ru-RU" smtClean="0"/>
+              <a:t>14.06.2016</a:t>
             </a:fld>
             <a:endParaRPr lang="ru-RU"/>
           </a:p>
@@ -2670,7 +2581,7 @@
       </p:sp>
       <p:sp>
         <p:nvSpPr>
-          <p:cNvPr id="5" name="Нижний колонтитул 4"/>
+          <p:cNvPr id="5" name="Footer Placeholder 4"/>
           <p:cNvSpPr>
             <a:spLocks noGrp="1"/>
           </p:cNvSpPr>
@@ -2680,8 +2591,8 @@
         </p:nvSpPr>
         <p:spPr>
           <a:xfrm>
-            <a:off x="3124200" y="6356350"/>
-            <a:ext cx="2895600" cy="365125"/>
+            <a:off x="3028950" y="6356351"/>
+            <a:ext cx="3086100" cy="365125"/>
           </a:xfrm>
           <a:prstGeom prst="rect">
             <a:avLst/>
@@ -2707,7 +2618,7 @@
       </p:sp>
       <p:sp>
         <p:nvSpPr>
-          <p:cNvPr id="6" name="Номер слайда 5"/>
+          <p:cNvPr id="6" name="Slide Number Placeholder 5"/>
           <p:cNvSpPr>
             <a:spLocks noGrp="1"/>
           </p:cNvSpPr>
@@ -2717,8 +2628,8 @@
         </p:nvSpPr>
         <p:spPr>
           <a:xfrm>
-            <a:off x="6553200" y="6356350"/>
-            <a:ext cx="2133600" cy="365125"/>
+            <a:off x="6457950" y="6356351"/>
+            <a:ext cx="2057400" cy="365125"/>
           </a:xfrm>
           <a:prstGeom prst="rect">
             <a:avLst/>
@@ -2738,7 +2649,7 @@
             </a:lvl1pPr>
           </a:lstStyle>
           <a:p>
-            <a:fld id="{B19B0651-EE4F-4900-A07F-96A6BFA9D0F0}" type="slidenum">
+            <a:fld id="{AD077826-35F6-45AF-B5AB-3734735C3DD3}" type="slidenum">
               <a:rPr lang="ru-RU" smtClean="0"/>
               <a:t>‹#›</a:t>
             </a:fld>
@@ -2746,25 +2657,124 @@
           </a:p>
         </p:txBody>
       </p:sp>
+      <p:pic>
+        <p:nvPicPr>
+          <p:cNvPr id="10" name="Рисунок 9"/>
+          <p:cNvPicPr>
+            <a:picLocks noChangeAspect="1"/>
+          </p:cNvPicPr>
+          <p:nvPr userDrawn="1"/>
+        </p:nvPicPr>
+        <p:blipFill>
+          <a:blip r:embed="rId13">
+            <a:extLst>
+              <a:ext uri="{28A0092B-C50C-407E-A947-70E740481C1C}">
+                <a14:useLocalDpi xmlns:a14="http://schemas.microsoft.com/office/drawing/2010/main" val="0"/>
+              </a:ext>
+            </a:extLst>
+          </a:blip>
+          <a:stretch>
+            <a:fillRect/>
+          </a:stretch>
+        </p:blipFill>
+        <p:spPr>
+          <a:xfrm>
+            <a:off x="4602920" y="0"/>
+            <a:ext cx="4541079" cy="3405809"/>
+          </a:xfrm>
+          <a:prstGeom prst="rect">
+            <a:avLst/>
+          </a:prstGeom>
+        </p:spPr>
+      </p:pic>
+      <p:sp>
+        <p:nvSpPr>
+          <p:cNvPr id="11" name="Прямоугольник 10"/>
+          <p:cNvSpPr/>
+          <p:nvPr userDrawn="1"/>
+        </p:nvSpPr>
+        <p:spPr>
+          <a:xfrm>
+            <a:off x="7659756" y="1646237"/>
+            <a:ext cx="1484243" cy="1759572"/>
+          </a:xfrm>
+          <a:prstGeom prst="rect">
+            <a:avLst/>
+          </a:prstGeom>
+          <a:gradFill>
+            <a:gsLst>
+              <a:gs pos="0">
+                <a:schemeClr val="accent1">
+                  <a:lumMod val="5000"/>
+                  <a:lumOff val="95000"/>
+                  <a:alpha val="0"/>
+                </a:schemeClr>
+              </a:gs>
+              <a:gs pos="74000">
+                <a:schemeClr val="bg1"/>
+              </a:gs>
+              <a:gs pos="100000">
+                <a:schemeClr val="bg1"/>
+              </a:gs>
+            </a:gsLst>
+            <a:lin ang="5400000" scaled="1"/>
+          </a:gradFill>
+          <a:ln>
+            <a:noFill/>
+          </a:ln>
+        </p:spPr>
+        <p:style>
+          <a:lnRef idx="2">
+            <a:schemeClr val="accent1">
+              <a:shade val="50000"/>
+            </a:schemeClr>
+          </a:lnRef>
+          <a:fillRef idx="1">
+            <a:schemeClr val="accent1"/>
+          </a:fillRef>
+          <a:effectRef idx="0">
+            <a:schemeClr val="accent1"/>
+          </a:effectRef>
+          <a:fontRef idx="minor">
+            <a:schemeClr val="lt1"/>
+          </a:fontRef>
+        </p:style>
+        <p:txBody>
+          <a:bodyPr rtlCol="0" anchor="ctr"/>
+          <a:lstStyle/>
+          <a:p>
+            <a:pPr algn="ctr"/>
+            <a:endParaRPr lang="ru-RU"/>
+          </a:p>
+        </p:txBody>
+      </p:sp>
     </p:spTree>
+    <p:extLst>
+      <p:ext uri="{BB962C8B-B14F-4D97-AF65-F5344CB8AC3E}">
+        <p14:creationId xmlns:p14="http://schemas.microsoft.com/office/powerpoint/2010/main" val="2005992200"/>
+      </p:ext>
+    </p:extLst>
   </p:cSld>
   <p:clrMap bg1="lt1" tx1="dk1" bg2="lt2" tx2="dk2" accent1="accent1" accent2="accent2" accent3="accent3" accent4="accent4" accent5="accent5" accent6="accent6" hlink="hlink" folHlink="folHlink"/>
   <p:sldLayoutIdLst>
-    <p:sldLayoutId id="2147483649" r:id="rId1"/>
-    <p:sldLayoutId id="2147483650" r:id="rId2"/>
-    <p:sldLayoutId id="2147483651" r:id="rId3"/>
-    <p:sldLayoutId id="2147483652" r:id="rId4"/>
-    <p:sldLayoutId id="2147483653" r:id="rId5"/>
-    <p:sldLayoutId id="2147483654" r:id="rId6"/>
-    <p:sldLayoutId id="2147483655" r:id="rId7"/>
-    <p:sldLayoutId id="2147483656" r:id="rId8"/>
-    <p:sldLayoutId id="2147483657" r:id="rId9"/>
-    <p:sldLayoutId id="2147483658" r:id="rId10"/>
-    <p:sldLayoutId id="2147483659" r:id="rId11"/>
+    <p:sldLayoutId id="2147483661" r:id="rId1"/>
+    <p:sldLayoutId id="2147483662" r:id="rId2"/>
+    <p:sldLayoutId id="2147483663" r:id="rId3"/>
+    <p:sldLayoutId id="2147483664" r:id="rId4"/>
+    <p:sldLayoutId id="2147483665" r:id="rId5"/>
+    <p:sldLayoutId id="2147483666" r:id="rId6"/>
+    <p:sldLayoutId id="2147483667" r:id="rId7"/>
+    <p:sldLayoutId id="2147483668" r:id="rId8"/>
+    <p:sldLayoutId id="2147483669" r:id="rId9"/>
+    <p:sldLayoutId id="2147483670" r:id="rId10"/>
+    <p:sldLayoutId id="2147483671" r:id="rId11"/>
   </p:sldLayoutIdLst>
   <p:txStyles>
     <p:titleStyle>
-      <a:lvl1pPr algn="ctr" defTabSz="914400" rtl="0" eaLnBrk="1" latinLnBrk="0" hangingPunct="1">
+      <a:lvl1pPr algn="l" defTabSz="914400" rtl="0" eaLnBrk="1" latinLnBrk="0" hangingPunct="1">
+        <a:lnSpc>
+          <a:spcPct val="90000"/>
+        </a:lnSpc>
         <a:spcBef>
           <a:spcPct val="0"/>
         </a:spcBef>
@@ -2780,13 +2790,16 @@
       </a:lvl1pPr>
     </p:titleStyle>
     <p:bodyStyle>
-      <a:lvl1pPr marL="342900" indent="-342900" algn="l" defTabSz="914400" rtl="0" eaLnBrk="1" latinLnBrk="0" hangingPunct="1">
+      <a:lvl1pPr marL="228600" indent="-228600" algn="l" defTabSz="914400" rtl="0" eaLnBrk="1" latinLnBrk="0" hangingPunct="1">
+        <a:lnSpc>
+          <a:spcPct val="90000"/>
+        </a:lnSpc>
         <a:spcBef>
-          <a:spcPct val="20000"/>
+          <a:spcPts val="1000"/>
         </a:spcBef>
-        <a:buFont typeface="Arial" pitchFamily="34" charset="0"/>
+        <a:buFont typeface="Arial" panose="020B0604020202020204" pitchFamily="34" charset="0"/>
         <a:buChar char="•"/>
-        <a:defRPr sz="3200" kern="1200">
+        <a:defRPr sz="2800" kern="1200">
           <a:solidFill>
             <a:schemeClr val="tx1"/>
           </a:solidFill>
@@ -2795,13 +2808,16 @@
           <a:cs typeface="+mn-cs"/>
         </a:defRPr>
       </a:lvl1pPr>
-      <a:lvl2pPr marL="742950" indent="-285750" algn="l" defTabSz="914400" rtl="0" eaLnBrk="1" latinLnBrk="0" hangingPunct="1">
+      <a:lvl2pPr marL="685800" indent="-228600" algn="l" defTabSz="914400" rtl="0" eaLnBrk="1" latinLnBrk="0" hangingPunct="1">
+        <a:lnSpc>
+          <a:spcPct val="90000"/>
+        </a:lnSpc>
         <a:spcBef>
-          <a:spcPct val="20000"/>
+          <a:spcPts val="500"/>
         </a:spcBef>
-        <a:buFont typeface="Arial" pitchFamily="34" charset="0"/>
-        <a:buChar char="–"/>
-        <a:defRPr sz="2800" kern="1200">
+        <a:buFont typeface="Arial" panose="020B0604020202020204" pitchFamily="34" charset="0"/>
+        <a:buChar char="•"/>
+        <a:defRPr sz="2400" kern="1200">
           <a:solidFill>
             <a:schemeClr val="tx1"/>
           </a:solidFill>
@@ -2811,12 +2827,15 @@
         </a:defRPr>
       </a:lvl2pPr>
       <a:lvl3pPr marL="1143000" indent="-228600" algn="l" defTabSz="914400" rtl="0" eaLnBrk="1" latinLnBrk="0" hangingPunct="1">
+        <a:lnSpc>
+          <a:spcPct val="90000"/>
+        </a:lnSpc>
         <a:spcBef>
-          <a:spcPct val="20000"/>
+          <a:spcPts val="500"/>
         </a:spcBef>
-        <a:buFont typeface="Arial" pitchFamily="34" charset="0"/>
+        <a:buFont typeface="Arial" panose="020B0604020202020204" pitchFamily="34" charset="0"/>
         <a:buChar char="•"/>
-        <a:defRPr sz="2400" kern="1200">
+        <a:defRPr sz="2000" kern="1200">
           <a:solidFill>
             <a:schemeClr val="tx1"/>
           </a:solidFill>
@@ -2826,12 +2845,15 @@
         </a:defRPr>
       </a:lvl3pPr>
       <a:lvl4pPr marL="1600200" indent="-228600" algn="l" defTabSz="914400" rtl="0" eaLnBrk="1" latinLnBrk="0" hangingPunct="1">
+        <a:lnSpc>
+          <a:spcPct val="90000"/>
+        </a:lnSpc>
         <a:spcBef>
-          <a:spcPct val="20000"/>
+          <a:spcPts val="500"/>
         </a:spcBef>
-        <a:buFont typeface="Arial" pitchFamily="34" charset="0"/>
-        <a:buChar char="–"/>
-        <a:defRPr sz="2000" kern="1200">
+        <a:buFont typeface="Arial" panose="020B0604020202020204" pitchFamily="34" charset="0"/>
+        <a:buChar char="•"/>
+        <a:defRPr sz="1800" kern="1200">
           <a:solidFill>
             <a:schemeClr val="tx1"/>
           </a:solidFill>
@@ -2841,12 +2863,15 @@
         </a:defRPr>
       </a:lvl4pPr>
       <a:lvl5pPr marL="2057400" indent="-228600" algn="l" defTabSz="914400" rtl="0" eaLnBrk="1" latinLnBrk="0" hangingPunct="1">
+        <a:lnSpc>
+          <a:spcPct val="90000"/>
+        </a:lnSpc>
         <a:spcBef>
-          <a:spcPct val="20000"/>
+          <a:spcPts val="500"/>
         </a:spcBef>
-        <a:buFont typeface="Arial" pitchFamily="34" charset="0"/>
-        <a:buChar char="»"/>
-        <a:defRPr sz="2000" kern="1200">
+        <a:buFont typeface="Arial" panose="020B0604020202020204" pitchFamily="34" charset="0"/>
+        <a:buChar char="•"/>
+        <a:defRPr sz="1800" kern="1200">
           <a:solidFill>
             <a:schemeClr val="tx1"/>
           </a:solidFill>
@@ -2856,12 +2881,15 @@
         </a:defRPr>
       </a:lvl5pPr>
       <a:lvl6pPr marL="2514600" indent="-228600" algn="l" defTabSz="914400" rtl="0" eaLnBrk="1" latinLnBrk="0" hangingPunct="1">
+        <a:lnSpc>
+          <a:spcPct val="90000"/>
+        </a:lnSpc>
         <a:spcBef>
-          <a:spcPct val="20000"/>
+          <a:spcPts val="500"/>
         </a:spcBef>
-        <a:buFont typeface="Arial" pitchFamily="34" charset="0"/>
+        <a:buFont typeface="Arial" panose="020B0604020202020204" pitchFamily="34" charset="0"/>
         <a:buChar char="•"/>
-        <a:defRPr sz="2000" kern="1200">
+        <a:defRPr sz="1800" kern="1200">
           <a:solidFill>
             <a:schemeClr val="tx1"/>
           </a:solidFill>
@@ -2871,12 +2899,15 @@
         </a:defRPr>
       </a:lvl6pPr>
       <a:lvl7pPr marL="2971800" indent="-228600" algn="l" defTabSz="914400" rtl="0" eaLnBrk="1" latinLnBrk="0" hangingPunct="1">
+        <a:lnSpc>
+          <a:spcPct val="90000"/>
+        </a:lnSpc>
         <a:spcBef>
-          <a:spcPct val="20000"/>
+          <a:spcPts val="500"/>
         </a:spcBef>
-        <a:buFont typeface="Arial" pitchFamily="34" charset="0"/>
+        <a:buFont typeface="Arial" panose="020B0604020202020204" pitchFamily="34" charset="0"/>
         <a:buChar char="•"/>
-        <a:defRPr sz="2000" kern="1200">
+        <a:defRPr sz="1800" kern="1200">
           <a:solidFill>
             <a:schemeClr val="tx1"/>
           </a:solidFill>
@@ -2886,12 +2917,15 @@
         </a:defRPr>
       </a:lvl7pPr>
       <a:lvl8pPr marL="3429000" indent="-228600" algn="l" defTabSz="914400" rtl="0" eaLnBrk="1" latinLnBrk="0" hangingPunct="1">
+        <a:lnSpc>
+          <a:spcPct val="90000"/>
+        </a:lnSpc>
         <a:spcBef>
-          <a:spcPct val="20000"/>
+          <a:spcPts val="500"/>
         </a:spcBef>
-        <a:buFont typeface="Arial" pitchFamily="34" charset="0"/>
+        <a:buFont typeface="Arial" panose="020B0604020202020204" pitchFamily="34" charset="0"/>
         <a:buChar char="•"/>
-        <a:defRPr sz="2000" kern="1200">
+        <a:defRPr sz="1800" kern="1200">
           <a:solidFill>
             <a:schemeClr val="tx1"/>
           </a:solidFill>
@@ -2901,12 +2935,15 @@
         </a:defRPr>
       </a:lvl8pPr>
       <a:lvl9pPr marL="3886200" indent="-228600" algn="l" defTabSz="914400" rtl="0" eaLnBrk="1" latinLnBrk="0" hangingPunct="1">
+        <a:lnSpc>
+          <a:spcPct val="90000"/>
+        </a:lnSpc>
         <a:spcBef>
-          <a:spcPct val="20000"/>
+          <a:spcPts val="500"/>
         </a:spcBef>
-        <a:buFont typeface="Arial" pitchFamily="34" charset="0"/>
+        <a:buFont typeface="Arial" panose="020B0604020202020204" pitchFamily="34" charset="0"/>
         <a:buChar char="•"/>
-        <a:defRPr sz="2000" kern="1200">
+        <a:defRPr sz="1800" kern="1200">
           <a:solidFill>
             <a:schemeClr val="tx1"/>
           </a:solidFill>
@@ -2918,7 +2955,7 @@
     </p:bodyStyle>
     <p:otherStyle>
       <a:defPPr>
-        <a:defRPr lang="ru-RU"/>
+        <a:defRPr lang="en-US"/>
       </a:defPPr>
       <a:lvl1pPr marL="0" algn="l" defTabSz="914400" rtl="0" eaLnBrk="1" latinLnBrk="0" hangingPunct="1">
         <a:defRPr sz="1800" kern="1200">
@@ -3015,10 +3052,2351 @@
 </p:sldMaster>
 </file>
 
+<file path=ppt/slides/slide1.xml><?xml version="1.0" encoding="utf-8"?>
+<p:sld xmlns:a="http://schemas.openxmlformats.org/drawingml/2006/main" xmlns:r="http://schemas.openxmlformats.org/officeDocument/2006/relationships" xmlns:p="http://schemas.openxmlformats.org/presentationml/2006/main">
+  <p:cSld>
+    <p:spTree>
+      <p:nvGrpSpPr>
+        <p:cNvPr id="1" name=""/>
+        <p:cNvGrpSpPr/>
+        <p:nvPr/>
+      </p:nvGrpSpPr>
+      <p:grpSpPr>
+        <a:xfrm>
+          <a:off x="0" y="0"/>
+          <a:ext cx="0" cy="0"/>
+          <a:chOff x="0" y="0"/>
+          <a:chExt cx="0" cy="0"/>
+        </a:xfrm>
+      </p:grpSpPr>
+      <p:sp>
+        <p:nvSpPr>
+          <p:cNvPr id="6" name="Прямоугольник 5"/>
+          <p:cNvSpPr/>
+          <p:nvPr/>
+        </p:nvSpPr>
+        <p:spPr>
+          <a:xfrm>
+            <a:off x="0" y="0"/>
+            <a:ext cx="9144000" cy="6858000"/>
+          </a:xfrm>
+          <a:prstGeom prst="rect">
+            <a:avLst/>
+          </a:prstGeom>
+          <a:solidFill>
+            <a:schemeClr val="bg1"/>
+          </a:solidFill>
+          <a:ln>
+            <a:noFill/>
+          </a:ln>
+        </p:spPr>
+        <p:style>
+          <a:lnRef idx="2">
+            <a:schemeClr val="accent1">
+              <a:shade val="50000"/>
+            </a:schemeClr>
+          </a:lnRef>
+          <a:fillRef idx="1">
+            <a:schemeClr val="accent1"/>
+          </a:fillRef>
+          <a:effectRef idx="0">
+            <a:schemeClr val="accent1"/>
+          </a:effectRef>
+          <a:fontRef idx="minor">
+            <a:schemeClr val="lt1"/>
+          </a:fontRef>
+        </p:style>
+        <p:txBody>
+          <a:bodyPr rtlCol="0" anchor="ctr"/>
+          <a:lstStyle/>
+          <a:p>
+            <a:pPr algn="ctr"/>
+            <a:endParaRPr lang="ru-RU"/>
+          </a:p>
+        </p:txBody>
+      </p:sp>
+      <p:pic>
+        <p:nvPicPr>
+          <p:cNvPr id="5" name="Рисунок 4"/>
+          <p:cNvPicPr>
+            <a:picLocks noChangeAspect="1"/>
+          </p:cNvPicPr>
+          <p:nvPr/>
+        </p:nvPicPr>
+        <p:blipFill rotWithShape="1">
+          <a:blip r:embed="rId2">
+            <a:extLst>
+              <a:ext uri="{28A0092B-C50C-407E-A947-70E740481C1C}">
+                <a14:useLocalDpi xmlns:a14="http://schemas.microsoft.com/office/drawing/2010/main" val="0"/>
+              </a:ext>
+            </a:extLst>
+          </a:blip>
+          <a:srcRect r="17094"/>
+          <a:stretch/>
+        </p:blipFill>
+        <p:spPr>
+          <a:xfrm>
+            <a:off x="0" y="0"/>
+            <a:ext cx="9144000" cy="6858000"/>
+          </a:xfrm>
+          <a:prstGeom prst="rect">
+            <a:avLst/>
+          </a:prstGeom>
+        </p:spPr>
+      </p:pic>
+      <p:sp>
+        <p:nvSpPr>
+          <p:cNvPr id="2" name="Заголовок 1"/>
+          <p:cNvSpPr>
+            <a:spLocks noGrp="1"/>
+          </p:cNvSpPr>
+          <p:nvPr>
+            <p:ph type="ctrTitle"/>
+          </p:nvPr>
+        </p:nvSpPr>
+        <p:spPr>
+          <a:xfrm>
+            <a:off x="0" y="1742386"/>
+            <a:ext cx="4208929" cy="2387600"/>
+          </a:xfrm>
+        </p:spPr>
+        <p:txBody>
+          <a:bodyPr>
+            <a:noAutofit/>
+          </a:bodyPr>
+          <a:lstStyle/>
+          <a:p>
+            <a:pPr algn="l"/>
+            <a:r>
+              <a:rPr lang="ru-RU" sz="3200" cap="all" dirty="0" smtClean="0"/>
+              <a:t>Реализация </a:t>
+            </a:r>
+            <a:r>
+              <a:rPr lang="ru-RU" sz="3200" cap="all" dirty="0"/>
+              <a:t>базовых алгоритмов </a:t>
+            </a:r>
+            <a:r>
+              <a:rPr lang="ru-RU" sz="3200" cap="all" dirty="0" smtClean="0"/>
+              <a:t>и структур </a:t>
+            </a:r>
+            <a:r>
+              <a:rPr lang="ru-RU" sz="3200" cap="all" dirty="0"/>
+              <a:t>данных на языке </a:t>
+            </a:r>
+            <a:r>
+              <a:rPr lang="en-US" sz="3200" cap="all" dirty="0"/>
+              <a:t>Java</a:t>
+            </a:r>
+            <a:r>
+              <a:rPr lang="ru-RU" sz="3200" cap="all" dirty="0" smtClean="0"/>
+              <a:t>. </a:t>
+            </a:r>
+            <a:br>
+              <a:rPr lang="ru-RU" sz="3200" cap="all" dirty="0" smtClean="0"/>
+            </a:br>
+            <a:r>
+              <a:rPr lang="ru-RU" sz="3200" cap="all" dirty="0"/>
+              <a:t/>
+            </a:r>
+            <a:br>
+              <a:rPr lang="ru-RU" sz="3200" cap="all" dirty="0"/>
+            </a:br>
+            <a:r>
+              <a:rPr lang="ru-RU" sz="3200" cap="all" dirty="0" smtClean="0"/>
+              <a:t>сортировка шелла.</a:t>
+            </a:r>
+            <a:endParaRPr lang="ru-RU" sz="7200" dirty="0">
+              <a:ln w="0"/>
+              <a:effectLst>
+                <a:outerShdw blurRad="38100" dist="19050" dir="2700000" algn="tl" rotWithShape="0">
+                  <a:schemeClr val="dk1">
+                    <a:alpha val="40000"/>
+                  </a:schemeClr>
+                </a:outerShdw>
+              </a:effectLst>
+              <a:latin typeface="+mn-lt"/>
+            </a:endParaRPr>
+          </a:p>
+        </p:txBody>
+      </p:sp>
+      <p:sp>
+        <p:nvSpPr>
+          <p:cNvPr id="3" name="Подзаголовок 2"/>
+          <p:cNvSpPr>
+            <a:spLocks noGrp="1"/>
+          </p:cNvSpPr>
+          <p:nvPr>
+            <p:ph type="subTitle" idx="1"/>
+          </p:nvPr>
+        </p:nvSpPr>
+        <p:spPr>
+          <a:xfrm>
+            <a:off x="0" y="3920048"/>
+            <a:ext cx="3106271" cy="1655762"/>
+          </a:xfrm>
+        </p:spPr>
+        <p:txBody>
+          <a:bodyPr/>
+          <a:lstStyle/>
+          <a:p>
+            <a:endParaRPr lang="ru-RU" dirty="0"/>
+          </a:p>
+          <a:p>
+            <a:pPr algn="l"/>
+            <a:r>
+              <a:rPr lang="ru-RU" dirty="0"/>
+              <a:t>Чернавский Алексей, гр. 1541б</a:t>
+            </a:r>
+          </a:p>
+        </p:txBody>
+      </p:sp>
+    </p:spTree>
+    <p:extLst>
+      <p:ext uri="{BB962C8B-B14F-4D97-AF65-F5344CB8AC3E}">
+        <p14:creationId xmlns:p14="http://schemas.microsoft.com/office/powerpoint/2010/main" val="1645875501"/>
+      </p:ext>
+    </p:extLst>
+  </p:cSld>
+  <p:clrMapOvr>
+    <a:masterClrMapping/>
+  </p:clrMapOvr>
+  <p:timing>
+    <p:tnLst>
+      <p:par>
+        <p:cTn id="1" dur="indefinite" restart="never" nodeType="tmRoot"/>
+      </p:par>
+    </p:tnLst>
+  </p:timing>
+</p:sld>
+</file>
+
+<file path=ppt/slides/slide10.xml><?xml version="1.0" encoding="utf-8"?>
+<p:sld xmlns:a="http://schemas.openxmlformats.org/drawingml/2006/main" xmlns:r="http://schemas.openxmlformats.org/officeDocument/2006/relationships" xmlns:p="http://schemas.openxmlformats.org/presentationml/2006/main">
+  <p:cSld>
+    <p:spTree>
+      <p:nvGrpSpPr>
+        <p:cNvPr id="1" name=""/>
+        <p:cNvGrpSpPr/>
+        <p:nvPr/>
+      </p:nvGrpSpPr>
+      <p:grpSpPr>
+        <a:xfrm>
+          <a:off x="0" y="0"/>
+          <a:ext cx="0" cy="0"/>
+          <a:chOff x="0" y="0"/>
+          <a:chExt cx="0" cy="0"/>
+        </a:xfrm>
+      </p:grpSpPr>
+      <p:sp>
+        <p:nvSpPr>
+          <p:cNvPr id="2" name="Заголовок 1"/>
+          <p:cNvSpPr>
+            <a:spLocks noGrp="1"/>
+          </p:cNvSpPr>
+          <p:nvPr>
+            <p:ph type="title"/>
+          </p:nvPr>
+        </p:nvSpPr>
+        <p:spPr/>
+        <p:txBody>
+          <a:bodyPr/>
+          <a:lstStyle/>
+          <a:p>
+            <a:r>
+              <a:rPr lang="ru-RU" dirty="0" smtClean="0"/>
+              <a:t>Код дополнительного потока</a:t>
+            </a:r>
+            <a:endParaRPr lang="ru-RU" dirty="0"/>
+          </a:p>
+        </p:txBody>
+      </p:sp>
+      <p:pic>
+        <p:nvPicPr>
+          <p:cNvPr id="4" name="Рисунок 3"/>
+          <p:cNvPicPr>
+            <a:picLocks noChangeAspect="1"/>
+          </p:cNvPicPr>
+          <p:nvPr/>
+        </p:nvPicPr>
+        <p:blipFill>
+          <a:blip r:embed="rId2">
+            <a:extLst>
+              <a:ext uri="{28A0092B-C50C-407E-A947-70E740481C1C}">
+                <a14:useLocalDpi xmlns:a14="http://schemas.microsoft.com/office/drawing/2010/main" val="0"/>
+              </a:ext>
+            </a:extLst>
+          </a:blip>
+          <a:stretch>
+            <a:fillRect/>
+          </a:stretch>
+        </p:blipFill>
+        <p:spPr>
+          <a:xfrm>
+            <a:off x="-3" y="1418650"/>
+            <a:ext cx="9144003" cy="5439349"/>
+          </a:xfrm>
+          <a:prstGeom prst="rect">
+            <a:avLst/>
+          </a:prstGeom>
+        </p:spPr>
+      </p:pic>
+    </p:spTree>
+    <p:extLst>
+      <p:ext uri="{BB962C8B-B14F-4D97-AF65-F5344CB8AC3E}">
+        <p14:creationId xmlns:p14="http://schemas.microsoft.com/office/powerpoint/2010/main" val="4277743977"/>
+      </p:ext>
+    </p:extLst>
+  </p:cSld>
+  <p:clrMapOvr>
+    <a:masterClrMapping/>
+  </p:clrMapOvr>
+</p:sld>
+</file>
+
+<file path=ppt/slides/slide11.xml><?xml version="1.0" encoding="utf-8"?>
+<p:sld xmlns:a="http://schemas.openxmlformats.org/drawingml/2006/main" xmlns:r="http://schemas.openxmlformats.org/officeDocument/2006/relationships" xmlns:p="http://schemas.openxmlformats.org/presentationml/2006/main">
+  <p:cSld>
+    <p:spTree>
+      <p:nvGrpSpPr>
+        <p:cNvPr id="1" name=""/>
+        <p:cNvGrpSpPr/>
+        <p:nvPr/>
+      </p:nvGrpSpPr>
+      <p:grpSpPr>
+        <a:xfrm>
+          <a:off x="0" y="0"/>
+          <a:ext cx="0" cy="0"/>
+          <a:chOff x="0" y="0"/>
+          <a:chExt cx="0" cy="0"/>
+        </a:xfrm>
+      </p:grpSpPr>
+      <p:sp>
+        <p:nvSpPr>
+          <p:cNvPr id="2" name="Заголовок 1"/>
+          <p:cNvSpPr>
+            <a:spLocks noGrp="1"/>
+          </p:cNvSpPr>
+          <p:nvPr>
+            <p:ph type="title"/>
+          </p:nvPr>
+        </p:nvSpPr>
+        <p:spPr/>
+        <p:txBody>
+          <a:bodyPr/>
+          <a:lstStyle/>
+          <a:p>
+            <a:r>
+              <a:rPr lang="ru-RU" dirty="0" smtClean="0"/>
+              <a:t>Тестирование программы</a:t>
+            </a:r>
+            <a:endParaRPr lang="ru-RU" dirty="0"/>
+          </a:p>
+        </p:txBody>
+      </p:sp>
+      <p:graphicFrame>
+        <p:nvGraphicFramePr>
+          <p:cNvPr id="4" name="Объект 3"/>
+          <p:cNvGraphicFramePr>
+            <a:graphicFrameLocks noGrp="1"/>
+          </p:cNvGraphicFramePr>
+          <p:nvPr>
+            <p:ph idx="1"/>
+            <p:extLst>
+              <p:ext uri="{D42A27DB-BD31-4B8C-83A1-F6EECF244321}">
+                <p14:modId xmlns:p14="http://schemas.microsoft.com/office/powerpoint/2010/main" val="4037960577"/>
+              </p:ext>
+            </p:extLst>
+          </p:nvPr>
+        </p:nvGraphicFramePr>
+        <p:xfrm>
+          <a:off x="628650" y="1825623"/>
+          <a:ext cx="7886700" cy="4908809"/>
+        </p:xfrm>
+        <a:graphic>
+          <a:graphicData uri="http://schemas.openxmlformats.org/drawingml/2006/table">
+            <a:tbl>
+              <a:tblPr firstRow="1" bandRow="1">
+                <a:tableStyleId>{5C22544A-7EE6-4342-B048-85BDC9FD1C3A}</a:tableStyleId>
+              </a:tblPr>
+              <a:tblGrid>
+                <a:gridCol w="2628900"/>
+                <a:gridCol w="2628900"/>
+                <a:gridCol w="2628900"/>
+              </a:tblGrid>
+              <a:tr h="701258">
+                <a:tc>
+                  <a:txBody>
+                    <a:bodyPr/>
+                    <a:lstStyle/>
+                    <a:p>
+                      <a:r>
+                        <a:rPr lang="ru-RU" sz="2000" dirty="0" smtClean="0"/>
+                        <a:t>Действие</a:t>
+                      </a:r>
+                      <a:endParaRPr lang="ru-RU" sz="2000" dirty="0"/>
+                    </a:p>
+                  </a:txBody>
+                  <a:tcPr/>
+                </a:tc>
+                <a:tc>
+                  <a:txBody>
+                    <a:bodyPr/>
+                    <a:lstStyle/>
+                    <a:p>
+                      <a:r>
+                        <a:rPr lang="ru-RU" sz="2000" dirty="0" smtClean="0"/>
+                        <a:t>Ожидаемый результат</a:t>
+                      </a:r>
+                      <a:endParaRPr lang="ru-RU" sz="2000" dirty="0"/>
+                    </a:p>
+                  </a:txBody>
+                  <a:tcPr/>
+                </a:tc>
+                <a:tc>
+                  <a:txBody>
+                    <a:bodyPr/>
+                    <a:lstStyle/>
+                    <a:p>
+                      <a:r>
+                        <a:rPr lang="ru-RU" sz="2000" dirty="0" smtClean="0"/>
+                        <a:t>Реальный результат</a:t>
+                      </a:r>
+                      <a:endParaRPr lang="ru-RU" sz="2000" dirty="0"/>
+                    </a:p>
+                  </a:txBody>
+                  <a:tcPr/>
+                </a:tc>
+              </a:tr>
+              <a:tr h="2571281">
+                <a:tc>
+                  <a:txBody>
+                    <a:bodyPr/>
+                    <a:lstStyle/>
+                    <a:p>
+                      <a:r>
+                        <a:rPr lang="ru-RU" sz="2000" dirty="0" smtClean="0"/>
+                        <a:t>Загрузка файла в таблицу</a:t>
+                      </a:r>
+                      <a:endParaRPr lang="ru-RU" sz="2000" dirty="0"/>
+                    </a:p>
+                  </a:txBody>
+                  <a:tcPr/>
+                </a:tc>
+                <a:tc>
+                  <a:txBody>
+                    <a:bodyPr/>
+                    <a:lstStyle/>
+                    <a:p>
+                      <a:r>
+                        <a:rPr lang="ru-RU" sz="2000" dirty="0" smtClean="0"/>
+                        <a:t>Открытие файла</a:t>
+                      </a:r>
+                      <a:endParaRPr lang="ru-RU" sz="2000" dirty="0"/>
+                    </a:p>
+                  </a:txBody>
+                  <a:tcPr/>
+                </a:tc>
+                <a:tc>
+                  <a:txBody>
+                    <a:bodyPr/>
+                    <a:lstStyle/>
+                    <a:p>
+                      <a:r>
+                        <a:rPr lang="ru-RU" sz="2000" dirty="0" smtClean="0"/>
+                        <a:t>Отсутствие обработки исключения файла. Ошибка в консоли, работоспособность не потеряна (недочет)</a:t>
+                      </a:r>
+                      <a:endParaRPr lang="ru-RU" sz="2000" dirty="0"/>
+                    </a:p>
+                  </a:txBody>
+                  <a:tcPr/>
+                </a:tc>
+              </a:tr>
+              <a:tr h="1636270">
+                <a:tc>
+                  <a:txBody>
+                    <a:bodyPr/>
+                    <a:lstStyle/>
+                    <a:p>
+                      <a:r>
+                        <a:rPr lang="ru-RU" sz="2000" dirty="0" smtClean="0"/>
+                        <a:t>Сортировка пустой</a:t>
+                      </a:r>
+                      <a:r>
+                        <a:rPr lang="ru-RU" sz="2000" baseline="0" dirty="0" smtClean="0"/>
+                        <a:t> таблицы</a:t>
+                      </a:r>
+                      <a:endParaRPr lang="ru-RU" sz="2000" dirty="0"/>
+                    </a:p>
+                  </a:txBody>
+                  <a:tcPr/>
+                </a:tc>
+                <a:tc>
+                  <a:txBody>
+                    <a:bodyPr/>
+                    <a:lstStyle/>
+                    <a:p>
+                      <a:r>
+                        <a:rPr lang="ru-RU" sz="2000" dirty="0" smtClean="0"/>
+                        <a:t>Бездействие</a:t>
+                      </a:r>
+                      <a:endParaRPr lang="ru-RU" sz="2000" dirty="0"/>
+                    </a:p>
+                  </a:txBody>
+                  <a:tcPr/>
+                </a:tc>
+                <a:tc>
+                  <a:txBody>
+                    <a:bodyPr/>
+                    <a:lstStyle/>
+                    <a:p>
+                      <a:r>
+                        <a:rPr lang="ru-RU" sz="2000" dirty="0" smtClean="0"/>
+                        <a:t>Ошибка в консоли, работоспособность</a:t>
+                      </a:r>
+                      <a:r>
+                        <a:rPr lang="ru-RU" sz="2000" baseline="0" dirty="0" smtClean="0"/>
+                        <a:t> не потеряна (недочет)</a:t>
+                      </a:r>
+                      <a:endParaRPr lang="ru-RU" sz="2000" dirty="0"/>
+                    </a:p>
+                  </a:txBody>
+                  <a:tcPr/>
+                </a:tc>
+              </a:tr>
+            </a:tbl>
+          </a:graphicData>
+        </a:graphic>
+      </p:graphicFrame>
+    </p:spTree>
+    <p:extLst>
+      <p:ext uri="{BB962C8B-B14F-4D97-AF65-F5344CB8AC3E}">
+        <p14:creationId xmlns:p14="http://schemas.microsoft.com/office/powerpoint/2010/main" val="561303971"/>
+      </p:ext>
+    </p:extLst>
+  </p:cSld>
+  <p:clrMapOvr>
+    <a:masterClrMapping/>
+  </p:clrMapOvr>
+</p:sld>
+</file>
+
+<file path=ppt/slides/slide12.xml><?xml version="1.0" encoding="utf-8"?>
+<p:sld xmlns:a="http://schemas.openxmlformats.org/drawingml/2006/main" xmlns:r="http://schemas.openxmlformats.org/officeDocument/2006/relationships" xmlns:p="http://schemas.openxmlformats.org/presentationml/2006/main">
+  <p:cSld>
+    <p:spTree>
+      <p:nvGrpSpPr>
+        <p:cNvPr id="1" name=""/>
+        <p:cNvGrpSpPr/>
+        <p:nvPr/>
+      </p:nvGrpSpPr>
+      <p:grpSpPr>
+        <a:xfrm>
+          <a:off x="0" y="0"/>
+          <a:ext cx="0" cy="0"/>
+          <a:chOff x="0" y="0"/>
+          <a:chExt cx="0" cy="0"/>
+        </a:xfrm>
+      </p:grpSpPr>
+      <p:sp>
+        <p:nvSpPr>
+          <p:cNvPr id="2" name="Заголовок 1"/>
+          <p:cNvSpPr>
+            <a:spLocks noGrp="1"/>
+          </p:cNvSpPr>
+          <p:nvPr>
+            <p:ph type="title"/>
+          </p:nvPr>
+        </p:nvSpPr>
+        <p:spPr/>
+        <p:txBody>
+          <a:bodyPr/>
+          <a:lstStyle/>
+          <a:p>
+            <a:r>
+              <a:rPr lang="ru-RU" dirty="0" smtClean="0"/>
+              <a:t>Отладка программы</a:t>
+            </a:r>
+            <a:endParaRPr lang="ru-RU" dirty="0"/>
+          </a:p>
+        </p:txBody>
+      </p:sp>
+      <p:graphicFrame>
+        <p:nvGraphicFramePr>
+          <p:cNvPr id="4" name="Объект 3"/>
+          <p:cNvGraphicFramePr>
+            <a:graphicFrameLocks noGrp="1"/>
+          </p:cNvGraphicFramePr>
+          <p:nvPr>
+            <p:ph idx="1"/>
+            <p:extLst>
+              <p:ext uri="{D42A27DB-BD31-4B8C-83A1-F6EECF244321}">
+                <p14:modId xmlns:p14="http://schemas.microsoft.com/office/powerpoint/2010/main" val="858543710"/>
+              </p:ext>
+            </p:extLst>
+          </p:nvPr>
+        </p:nvGraphicFramePr>
+        <p:xfrm>
+          <a:off x="628650" y="1825625"/>
+          <a:ext cx="7886700" cy="3840480"/>
+        </p:xfrm>
+        <a:graphic>
+          <a:graphicData uri="http://schemas.openxmlformats.org/drawingml/2006/table">
+            <a:tbl>
+              <a:tblPr firstRow="1" bandRow="1">
+                <a:tableStyleId>{5C22544A-7EE6-4342-B048-85BDC9FD1C3A}</a:tableStyleId>
+              </a:tblPr>
+              <a:tblGrid>
+                <a:gridCol w="1577340"/>
+                <a:gridCol w="1577340"/>
+                <a:gridCol w="1577340"/>
+                <a:gridCol w="1577340"/>
+                <a:gridCol w="1577340"/>
+              </a:tblGrid>
+              <a:tr h="370840">
+                <a:tc>
+                  <a:txBody>
+                    <a:bodyPr/>
+                    <a:lstStyle/>
+                    <a:p>
+                      <a:r>
+                        <a:rPr lang="ru-RU" dirty="0" smtClean="0"/>
+                        <a:t>Действие</a:t>
+                      </a:r>
+                      <a:endParaRPr lang="ru-RU" dirty="0"/>
+                    </a:p>
+                  </a:txBody>
+                  <a:tcPr/>
+                </a:tc>
+                <a:tc>
+                  <a:txBody>
+                    <a:bodyPr/>
+                    <a:lstStyle/>
+                    <a:p>
+                      <a:r>
+                        <a:rPr lang="ru-RU" dirty="0" smtClean="0"/>
+                        <a:t>Результат</a:t>
+                      </a:r>
+                      <a:endParaRPr lang="ru-RU" dirty="0"/>
+                    </a:p>
+                  </a:txBody>
+                  <a:tcPr/>
+                </a:tc>
+                <a:tc>
+                  <a:txBody>
+                    <a:bodyPr/>
+                    <a:lstStyle/>
+                    <a:p>
+                      <a:r>
+                        <a:rPr lang="ru-RU" dirty="0" smtClean="0"/>
+                        <a:t>Ошибка</a:t>
+                      </a:r>
+                      <a:endParaRPr lang="ru-RU" dirty="0"/>
+                    </a:p>
+                  </a:txBody>
+                  <a:tcPr/>
+                </a:tc>
+                <a:tc>
+                  <a:txBody>
+                    <a:bodyPr/>
+                    <a:lstStyle/>
+                    <a:p>
+                      <a:r>
+                        <a:rPr lang="ru-RU" dirty="0" smtClean="0"/>
+                        <a:t>Локализация ошибки</a:t>
+                      </a:r>
+                      <a:endParaRPr lang="ru-RU" dirty="0"/>
+                    </a:p>
+                  </a:txBody>
+                  <a:tcPr/>
+                </a:tc>
+                <a:tc>
+                  <a:txBody>
+                    <a:bodyPr/>
+                    <a:lstStyle/>
+                    <a:p>
+                      <a:r>
+                        <a:rPr lang="ru-RU" dirty="0" smtClean="0"/>
+                        <a:t>Способ</a:t>
+                      </a:r>
+                      <a:r>
+                        <a:rPr lang="ru-RU" baseline="0" dirty="0" smtClean="0"/>
+                        <a:t> исправления</a:t>
+                      </a:r>
+                      <a:endParaRPr lang="ru-RU" dirty="0"/>
+                    </a:p>
+                  </a:txBody>
+                  <a:tcPr/>
+                </a:tc>
+              </a:tr>
+              <a:tr h="370840">
+                <a:tc>
+                  <a:txBody>
+                    <a:bodyPr/>
+                    <a:lstStyle/>
+                    <a:p>
+                      <a:r>
+                        <a:rPr lang="ru-RU" dirty="0" smtClean="0"/>
+                        <a:t>Открытие</a:t>
+                      </a:r>
+                      <a:r>
+                        <a:rPr lang="ru-RU" baseline="0" dirty="0" smtClean="0"/>
+                        <a:t> файла (нажатие на кнопку «Загрузить»)</a:t>
+                      </a:r>
+                      <a:endParaRPr lang="ru-RU" dirty="0"/>
+                    </a:p>
+                  </a:txBody>
+                  <a:tcPr/>
+                </a:tc>
+                <a:tc>
+                  <a:txBody>
+                    <a:bodyPr/>
+                    <a:lstStyle/>
+                    <a:p>
+                      <a:r>
+                        <a:rPr lang="ru-RU" dirty="0" smtClean="0"/>
+                        <a:t>Бездействие</a:t>
+                      </a:r>
+                    </a:p>
+                    <a:p>
+                      <a:r>
+                        <a:rPr lang="ru-RU" dirty="0" smtClean="0"/>
+                        <a:t>(ошибка в консоли)</a:t>
+                      </a:r>
+                      <a:endParaRPr lang="ru-RU" dirty="0"/>
+                    </a:p>
+                  </a:txBody>
+                  <a:tcPr/>
+                </a:tc>
+                <a:tc>
+                  <a:txBody>
+                    <a:bodyPr/>
+                    <a:lstStyle/>
+                    <a:p>
+                      <a:r>
+                        <a:rPr lang="ru-RU" dirty="0" smtClean="0"/>
+                        <a:t>Отсутствие либо неправильный формат файла</a:t>
+                      </a:r>
+                      <a:endParaRPr lang="ru-RU" dirty="0"/>
+                    </a:p>
+                  </a:txBody>
+                  <a:tcPr/>
+                </a:tc>
+                <a:tc>
+                  <a:txBody>
+                    <a:bodyPr/>
+                    <a:lstStyle/>
+                    <a:p>
+                      <a:r>
+                        <a:rPr lang="en-US" dirty="0" smtClean="0"/>
+                        <a:t>Class Controller</a:t>
+                      </a:r>
+                    </a:p>
+                    <a:p>
+                      <a:endParaRPr lang="en-US" dirty="0" smtClean="0"/>
+                    </a:p>
+                    <a:p>
+                      <a:r>
+                        <a:rPr lang="en-US" dirty="0" smtClean="0"/>
+                        <a:t>Method </a:t>
+                      </a:r>
+                      <a:r>
+                        <a:rPr lang="en-US" dirty="0" err="1" smtClean="0"/>
+                        <a:t>openExcel</a:t>
+                      </a:r>
+                      <a:endParaRPr lang="ru-RU" dirty="0"/>
+                    </a:p>
+                  </a:txBody>
+                  <a:tcPr/>
+                </a:tc>
+                <a:tc>
+                  <a:txBody>
+                    <a:bodyPr/>
+                    <a:lstStyle/>
+                    <a:p>
+                      <a:r>
+                        <a:rPr lang="ru-RU" dirty="0" smtClean="0"/>
+                        <a:t>Добавлен </a:t>
+                      </a:r>
+                      <a:r>
+                        <a:rPr lang="en-US" dirty="0" smtClean="0"/>
+                        <a:t>try{} catch{} </a:t>
+                      </a:r>
+                      <a:r>
+                        <a:rPr lang="ru-RU" dirty="0" smtClean="0"/>
+                        <a:t>обработчик</a:t>
+                      </a:r>
+                      <a:r>
+                        <a:rPr lang="ru-RU" baseline="0" dirty="0" smtClean="0"/>
+                        <a:t> на открытие файла</a:t>
+                      </a:r>
+                      <a:endParaRPr lang="ru-RU" dirty="0"/>
+                    </a:p>
+                  </a:txBody>
+                  <a:tcPr/>
+                </a:tc>
+              </a:tr>
+              <a:tr h="370840">
+                <a:tc>
+                  <a:txBody>
+                    <a:bodyPr/>
+                    <a:lstStyle/>
+                    <a:p>
+                      <a:r>
+                        <a:rPr lang="ru-RU" dirty="0" smtClean="0"/>
+                        <a:t>Нажатие на кнопку сортировки массива при отсутствии значений</a:t>
+                      </a:r>
+                      <a:endParaRPr lang="ru-RU" dirty="0"/>
+                    </a:p>
+                  </a:txBody>
+                  <a:tcPr/>
+                </a:tc>
+                <a:tc>
+                  <a:txBody>
+                    <a:bodyPr/>
+                    <a:lstStyle/>
+                    <a:p>
+                      <a:r>
+                        <a:rPr lang="ru-RU" dirty="0" smtClean="0"/>
+                        <a:t>Бездействие</a:t>
+                      </a:r>
+                    </a:p>
+                    <a:p>
+                      <a:r>
+                        <a:rPr lang="ru-RU" dirty="0" smtClean="0"/>
+                        <a:t>(ошибка в консоли)</a:t>
+                      </a:r>
+                      <a:endParaRPr lang="ru-RU" dirty="0"/>
+                    </a:p>
+                  </a:txBody>
+                  <a:tcPr/>
+                </a:tc>
+                <a:tc>
+                  <a:txBody>
+                    <a:bodyPr/>
+                    <a:lstStyle/>
+                    <a:p>
+                      <a:r>
+                        <a:rPr lang="ru-RU" dirty="0" smtClean="0"/>
+                        <a:t>Невозможно отсортировать</a:t>
+                      </a:r>
+                      <a:r>
+                        <a:rPr lang="ru-RU" baseline="0" dirty="0" smtClean="0"/>
+                        <a:t> пустую таблицу</a:t>
+                      </a:r>
+                      <a:endParaRPr lang="ru-RU" dirty="0"/>
+                    </a:p>
+                  </a:txBody>
+                  <a:tcPr/>
+                </a:tc>
+                <a:tc>
+                  <a:txBody>
+                    <a:bodyPr/>
+                    <a:lstStyle/>
+                    <a:p>
+                      <a:r>
+                        <a:rPr lang="en-US" dirty="0" smtClean="0"/>
+                        <a:t>Class</a:t>
+                      </a:r>
+                      <a:r>
+                        <a:rPr lang="en-US" baseline="0" dirty="0" smtClean="0"/>
+                        <a:t> Controller</a:t>
+                      </a:r>
+                    </a:p>
+                    <a:p>
+                      <a:endParaRPr lang="en-US" baseline="0" dirty="0" smtClean="0"/>
+                    </a:p>
+                    <a:p>
+                      <a:r>
+                        <a:rPr lang="en-US" baseline="0" dirty="0" smtClean="0"/>
+                        <a:t>Methods:</a:t>
+                      </a:r>
+                    </a:p>
+                    <a:p>
+                      <a:r>
+                        <a:rPr lang="en-US" baseline="0" dirty="0" err="1" smtClean="0"/>
+                        <a:t>sortByNumber</a:t>
+                      </a:r>
+                      <a:endParaRPr lang="en-US" baseline="0" dirty="0" smtClean="0"/>
+                    </a:p>
+                    <a:p>
+                      <a:r>
+                        <a:rPr lang="en-US" baseline="0" dirty="0" err="1" smtClean="0"/>
+                        <a:t>sortByMisses</a:t>
+                      </a:r>
+                      <a:endParaRPr lang="ru-RU" dirty="0"/>
+                    </a:p>
+                  </a:txBody>
+                  <a:tcPr/>
+                </a:tc>
+                <a:tc>
+                  <a:txBody>
+                    <a:bodyPr/>
+                    <a:lstStyle/>
+                    <a:p>
+                      <a:r>
+                        <a:rPr lang="ru-RU" dirty="0" smtClean="0"/>
+                        <a:t>Добавлен</a:t>
+                      </a:r>
+                      <a:r>
+                        <a:rPr lang="ru-RU" baseline="0" dirty="0" smtClean="0"/>
+                        <a:t> обработчик на проверку данных в  массиве</a:t>
+                      </a:r>
+                      <a:endParaRPr lang="ru-RU" dirty="0"/>
+                    </a:p>
+                  </a:txBody>
+                  <a:tcPr/>
+                </a:tc>
+              </a:tr>
+            </a:tbl>
+          </a:graphicData>
+        </a:graphic>
+      </p:graphicFrame>
+    </p:spTree>
+    <p:extLst>
+      <p:ext uri="{BB962C8B-B14F-4D97-AF65-F5344CB8AC3E}">
+        <p14:creationId xmlns:p14="http://schemas.microsoft.com/office/powerpoint/2010/main" val="2692580621"/>
+      </p:ext>
+    </p:extLst>
+  </p:cSld>
+  <p:clrMapOvr>
+    <a:masterClrMapping/>
+  </p:clrMapOvr>
+</p:sld>
+</file>
+
+<file path=ppt/slides/slide13.xml><?xml version="1.0" encoding="utf-8"?>
+<p:sld xmlns:a="http://schemas.openxmlformats.org/drawingml/2006/main" xmlns:r="http://schemas.openxmlformats.org/officeDocument/2006/relationships" xmlns:p="http://schemas.openxmlformats.org/presentationml/2006/main">
+  <p:cSld>
+    <p:spTree>
+      <p:nvGrpSpPr>
+        <p:cNvPr id="1" name=""/>
+        <p:cNvGrpSpPr/>
+        <p:nvPr/>
+      </p:nvGrpSpPr>
+      <p:grpSpPr>
+        <a:xfrm>
+          <a:off x="0" y="0"/>
+          <a:ext cx="0" cy="0"/>
+          <a:chOff x="0" y="0"/>
+          <a:chExt cx="0" cy="0"/>
+        </a:xfrm>
+      </p:grpSpPr>
+      <p:sp>
+        <p:nvSpPr>
+          <p:cNvPr id="2" name="Заголовок 1"/>
+          <p:cNvSpPr>
+            <a:spLocks noGrp="1"/>
+          </p:cNvSpPr>
+          <p:nvPr>
+            <p:ph type="title"/>
+          </p:nvPr>
+        </p:nvSpPr>
+        <p:spPr/>
+        <p:txBody>
+          <a:bodyPr/>
+          <a:lstStyle/>
+          <a:p>
+            <a:r>
+              <a:rPr lang="ru-RU" dirty="0" smtClean="0"/>
+              <a:t>Заключение</a:t>
+            </a:r>
+            <a:endParaRPr lang="ru-RU" dirty="0"/>
+          </a:p>
+        </p:txBody>
+      </p:sp>
+      <p:sp>
+        <p:nvSpPr>
+          <p:cNvPr id="3" name="Объект 2"/>
+          <p:cNvSpPr>
+            <a:spLocks noGrp="1"/>
+          </p:cNvSpPr>
+          <p:nvPr>
+            <p:ph idx="1"/>
+          </p:nvPr>
+        </p:nvSpPr>
+        <p:spPr/>
+        <p:txBody>
+          <a:bodyPr/>
+          <a:lstStyle/>
+          <a:p>
+            <a:r>
+              <a:rPr lang="ru-RU" dirty="0"/>
+              <a:t>В ходе выполнения данного курсового проекта был спроектирован и реализован программный продукт «</a:t>
+            </a:r>
+            <a:r>
+              <a:rPr lang="en-US" dirty="0"/>
+              <a:t>Shell sort</a:t>
+            </a:r>
+            <a:r>
+              <a:rPr lang="ru-RU" dirty="0"/>
+              <a:t>», который позволяет наглядно показать базовый алгоритм сортировки Шелла</a:t>
+            </a:r>
+            <a:endParaRPr lang="ru-RU" dirty="0"/>
+          </a:p>
+        </p:txBody>
+      </p:sp>
+    </p:spTree>
+    <p:extLst>
+      <p:ext uri="{BB962C8B-B14F-4D97-AF65-F5344CB8AC3E}">
+        <p14:creationId xmlns:p14="http://schemas.microsoft.com/office/powerpoint/2010/main" val="1098607917"/>
+      </p:ext>
+    </p:extLst>
+  </p:cSld>
+  <p:clrMapOvr>
+    <a:masterClrMapping/>
+  </p:clrMapOvr>
+</p:sld>
+</file>
+
+<file path=ppt/slides/slide2.xml><?xml version="1.0" encoding="utf-8"?>
+<p:sld xmlns:a="http://schemas.openxmlformats.org/drawingml/2006/main" xmlns:r="http://schemas.openxmlformats.org/officeDocument/2006/relationships" xmlns:p="http://schemas.openxmlformats.org/presentationml/2006/main">
+  <p:cSld>
+    <p:spTree>
+      <p:nvGrpSpPr>
+        <p:cNvPr id="1" name=""/>
+        <p:cNvGrpSpPr/>
+        <p:nvPr/>
+      </p:nvGrpSpPr>
+      <p:grpSpPr>
+        <a:xfrm>
+          <a:off x="0" y="0"/>
+          <a:ext cx="0" cy="0"/>
+          <a:chOff x="0" y="0"/>
+          <a:chExt cx="0" cy="0"/>
+        </a:xfrm>
+      </p:grpSpPr>
+      <p:sp>
+        <p:nvSpPr>
+          <p:cNvPr id="2" name="Заголовок 1"/>
+          <p:cNvSpPr>
+            <a:spLocks noGrp="1"/>
+          </p:cNvSpPr>
+          <p:nvPr>
+            <p:ph type="title"/>
+          </p:nvPr>
+        </p:nvSpPr>
+        <p:spPr>
+          <a:xfrm>
+            <a:off x="665488" y="365126"/>
+            <a:ext cx="7886700" cy="1325563"/>
+          </a:xfrm>
+        </p:spPr>
+        <p:txBody>
+          <a:bodyPr/>
+          <a:lstStyle/>
+          <a:p>
+            <a:r>
+              <a:rPr lang="ru-RU" dirty="0" smtClean="0"/>
+              <a:t>Разработка программы</a:t>
+            </a:r>
+            <a:endParaRPr lang="ru-RU" dirty="0"/>
+          </a:p>
+        </p:txBody>
+      </p:sp>
+      <p:pic>
+        <p:nvPicPr>
+          <p:cNvPr id="4" name="Объект 3"/>
+          <p:cNvPicPr>
+            <a:picLocks noGrp="1" noChangeAspect="1"/>
+          </p:cNvPicPr>
+          <p:nvPr>
+            <p:ph idx="1"/>
+          </p:nvPr>
+        </p:nvPicPr>
+        <p:blipFill>
+          <a:blip r:embed="rId2">
+            <a:extLst>
+              <a:ext uri="{28A0092B-C50C-407E-A947-70E740481C1C}">
+                <a14:useLocalDpi xmlns:a14="http://schemas.microsoft.com/office/drawing/2010/main" val="0"/>
+              </a:ext>
+            </a:extLst>
+          </a:blip>
+          <a:stretch>
+            <a:fillRect/>
+          </a:stretch>
+        </p:blipFill>
+        <p:spPr>
+          <a:xfrm>
+            <a:off x="0" y="1492049"/>
+            <a:ext cx="5476562" cy="3422851"/>
+          </a:xfrm>
+        </p:spPr>
+      </p:pic>
+      <p:pic>
+        <p:nvPicPr>
+          <p:cNvPr id="5" name="Рисунок 4"/>
+          <p:cNvPicPr>
+            <a:picLocks noChangeAspect="1"/>
+          </p:cNvPicPr>
+          <p:nvPr/>
+        </p:nvPicPr>
+        <p:blipFill>
+          <a:blip r:embed="rId3">
+            <a:extLst>
+              <a:ext uri="{28A0092B-C50C-407E-A947-70E740481C1C}">
+                <a14:useLocalDpi xmlns:a14="http://schemas.microsoft.com/office/drawing/2010/main" val="0"/>
+              </a:ext>
+            </a:extLst>
+          </a:blip>
+          <a:stretch>
+            <a:fillRect/>
+          </a:stretch>
+        </p:blipFill>
+        <p:spPr>
+          <a:xfrm>
+            <a:off x="7180820" y="4914900"/>
+            <a:ext cx="1943100" cy="1943100"/>
+          </a:xfrm>
+          <a:prstGeom prst="rect">
+            <a:avLst/>
+          </a:prstGeom>
+        </p:spPr>
+      </p:pic>
+      <p:sp>
+        <p:nvSpPr>
+          <p:cNvPr id="6" name="Прямоугольник 5"/>
+          <p:cNvSpPr/>
+          <p:nvPr/>
+        </p:nvSpPr>
+        <p:spPr>
+          <a:xfrm>
+            <a:off x="0" y="5424785"/>
+            <a:ext cx="7045968" cy="923330"/>
+          </a:xfrm>
+          <a:prstGeom prst="rect">
+            <a:avLst/>
+          </a:prstGeom>
+          <a:noFill/>
+        </p:spPr>
+        <p:txBody>
+          <a:bodyPr wrap="none" lIns="91440" tIns="45720" rIns="91440" bIns="45720">
+            <a:spAutoFit/>
+          </a:bodyPr>
+          <a:lstStyle/>
+          <a:p>
+            <a:pPr algn="ctr"/>
+            <a:r>
+              <a:rPr lang="en-US" sz="5400" b="1" cap="none" spc="0" dirty="0" err="1" smtClean="0">
+                <a:ln w="19050">
+                  <a:solidFill>
+                    <a:schemeClr val="tx2">
+                      <a:tint val="1000"/>
+                    </a:schemeClr>
+                  </a:solidFill>
+                  <a:prstDash val="solid"/>
+                </a:ln>
+                <a:solidFill>
+                  <a:schemeClr val="accent3"/>
+                </a:solidFill>
+                <a:effectLst>
+                  <a:outerShdw blurRad="50000" dist="50800" dir="7500000" algn="tl">
+                    <a:srgbClr val="000000">
+                      <a:shade val="5000"/>
+                      <a:alpha val="35000"/>
+                    </a:srgbClr>
+                  </a:outerShdw>
+                </a:effectLst>
+              </a:rPr>
+              <a:t>JavaFX</a:t>
+            </a:r>
+            <a:r>
+              <a:rPr lang="en-US" sz="5400" b="1" cap="none" spc="0" dirty="0" smtClean="0">
+                <a:ln w="19050">
+                  <a:solidFill>
+                    <a:schemeClr val="tx2">
+                      <a:tint val="1000"/>
+                    </a:schemeClr>
+                  </a:solidFill>
+                  <a:prstDash val="solid"/>
+                </a:ln>
+                <a:solidFill>
+                  <a:schemeClr val="accent3"/>
+                </a:solidFill>
+                <a:effectLst>
+                  <a:outerShdw blurRad="50000" dist="50800" dir="7500000" algn="tl">
+                    <a:srgbClr val="000000">
+                      <a:shade val="5000"/>
+                      <a:alpha val="35000"/>
+                    </a:srgbClr>
+                  </a:outerShdw>
+                </a:effectLst>
+              </a:rPr>
+              <a:t> </a:t>
+            </a:r>
+            <a:r>
+              <a:rPr lang="en-US" sz="5400" b="1" cap="none" spc="0" dirty="0" err="1" smtClean="0">
+                <a:ln w="19050">
+                  <a:solidFill>
+                    <a:schemeClr val="tx2">
+                      <a:tint val="1000"/>
+                    </a:schemeClr>
+                  </a:solidFill>
+                  <a:prstDash val="solid"/>
+                </a:ln>
+                <a:solidFill>
+                  <a:schemeClr val="accent3"/>
+                </a:solidFill>
+                <a:effectLst>
+                  <a:outerShdw blurRad="50000" dist="50800" dir="7500000" algn="tl">
+                    <a:srgbClr val="000000">
+                      <a:shade val="5000"/>
+                      <a:alpha val="35000"/>
+                    </a:srgbClr>
+                  </a:outerShdw>
+                </a:effectLst>
+              </a:rPr>
+              <a:t>SceneBuilder</a:t>
+            </a:r>
+            <a:r>
+              <a:rPr lang="en-US" sz="5400" b="1" cap="none" spc="0" dirty="0" smtClean="0">
+                <a:ln w="19050">
+                  <a:solidFill>
+                    <a:schemeClr val="tx2">
+                      <a:tint val="1000"/>
+                    </a:schemeClr>
+                  </a:solidFill>
+                  <a:prstDash val="solid"/>
+                </a:ln>
+                <a:solidFill>
+                  <a:schemeClr val="accent3"/>
+                </a:solidFill>
+                <a:effectLst>
+                  <a:outerShdw blurRad="50000" dist="50800" dir="7500000" algn="tl">
+                    <a:srgbClr val="000000">
+                      <a:shade val="5000"/>
+                      <a:alpha val="35000"/>
+                    </a:srgbClr>
+                  </a:outerShdw>
+                </a:effectLst>
+              </a:rPr>
+              <a:t> 2.0</a:t>
+            </a:r>
+          </a:p>
+        </p:txBody>
+      </p:sp>
+    </p:spTree>
+    <p:extLst>
+      <p:ext uri="{BB962C8B-B14F-4D97-AF65-F5344CB8AC3E}">
+        <p14:creationId xmlns:p14="http://schemas.microsoft.com/office/powerpoint/2010/main" val="2297975353"/>
+      </p:ext>
+    </p:extLst>
+  </p:cSld>
+  <p:clrMapOvr>
+    <a:masterClrMapping/>
+  </p:clrMapOvr>
+  <p:timing>
+    <p:tnLst>
+      <p:par>
+        <p:cTn id="1" dur="indefinite" restart="never" nodeType="tmRoot"/>
+      </p:par>
+    </p:tnLst>
+  </p:timing>
+</p:sld>
+</file>
+
+<file path=ppt/slides/slide3.xml><?xml version="1.0" encoding="utf-8"?>
+<p:sld xmlns:a="http://schemas.openxmlformats.org/drawingml/2006/main" xmlns:r="http://schemas.openxmlformats.org/officeDocument/2006/relationships" xmlns:p="http://schemas.openxmlformats.org/presentationml/2006/main">
+  <p:cSld>
+    <p:spTree>
+      <p:nvGrpSpPr>
+        <p:cNvPr id="1" name=""/>
+        <p:cNvGrpSpPr/>
+        <p:nvPr/>
+      </p:nvGrpSpPr>
+      <p:grpSpPr>
+        <a:xfrm>
+          <a:off x="0" y="0"/>
+          <a:ext cx="0" cy="0"/>
+          <a:chOff x="0" y="0"/>
+          <a:chExt cx="0" cy="0"/>
+        </a:xfrm>
+      </p:grpSpPr>
+      <p:sp>
+        <p:nvSpPr>
+          <p:cNvPr id="2" name="Заголовок 1"/>
+          <p:cNvSpPr>
+            <a:spLocks noGrp="1"/>
+          </p:cNvSpPr>
+          <p:nvPr>
+            <p:ph type="title"/>
+          </p:nvPr>
+        </p:nvSpPr>
+        <p:spPr/>
+        <p:txBody>
+          <a:bodyPr/>
+          <a:lstStyle/>
+          <a:p>
+            <a:endParaRPr lang="ru-RU"/>
+          </a:p>
+        </p:txBody>
+      </p:sp>
+      <p:pic>
+        <p:nvPicPr>
+          <p:cNvPr id="4" name="Объект 3"/>
+          <p:cNvPicPr>
+            <a:picLocks noGrp="1" noChangeAspect="1"/>
+          </p:cNvPicPr>
+          <p:nvPr>
+            <p:ph idx="1"/>
+          </p:nvPr>
+        </p:nvPicPr>
+        <p:blipFill>
+          <a:blip r:embed="rId2">
+            <a:extLst>
+              <a:ext uri="{28A0092B-C50C-407E-A947-70E740481C1C}">
+                <a14:useLocalDpi xmlns:a14="http://schemas.microsoft.com/office/drawing/2010/main" val="0"/>
+              </a:ext>
+            </a:extLst>
+          </a:blip>
+          <a:stretch>
+            <a:fillRect/>
+          </a:stretch>
+        </p:blipFill>
+        <p:spPr>
+          <a:xfrm>
+            <a:off x="0" y="0"/>
+            <a:ext cx="9120990" cy="6858000"/>
+          </a:xfrm>
+        </p:spPr>
+      </p:pic>
+    </p:spTree>
+    <p:extLst>
+      <p:ext uri="{BB962C8B-B14F-4D97-AF65-F5344CB8AC3E}">
+        <p14:creationId xmlns:p14="http://schemas.microsoft.com/office/powerpoint/2010/main" val="787556576"/>
+      </p:ext>
+    </p:extLst>
+  </p:cSld>
+  <p:clrMapOvr>
+    <a:masterClrMapping/>
+  </p:clrMapOvr>
+  <p:timing>
+    <p:tnLst>
+      <p:par>
+        <p:cTn id="1" dur="indefinite" restart="never" nodeType="tmRoot"/>
+      </p:par>
+    </p:tnLst>
+  </p:timing>
+</p:sld>
+</file>
+
+<file path=ppt/slides/slide4.xml><?xml version="1.0" encoding="utf-8"?>
+<p:sld xmlns:a="http://schemas.openxmlformats.org/drawingml/2006/main" xmlns:r="http://schemas.openxmlformats.org/officeDocument/2006/relationships" xmlns:p="http://schemas.openxmlformats.org/presentationml/2006/main">
+  <p:cSld>
+    <p:spTree>
+      <p:nvGrpSpPr>
+        <p:cNvPr id="1" name=""/>
+        <p:cNvGrpSpPr/>
+        <p:nvPr/>
+      </p:nvGrpSpPr>
+      <p:grpSpPr>
+        <a:xfrm>
+          <a:off x="0" y="0"/>
+          <a:ext cx="0" cy="0"/>
+          <a:chOff x="0" y="0"/>
+          <a:chExt cx="0" cy="0"/>
+        </a:xfrm>
+      </p:grpSpPr>
+      <p:sp>
+        <p:nvSpPr>
+          <p:cNvPr id="2" name="Заголовок 1"/>
+          <p:cNvSpPr>
+            <a:spLocks noGrp="1"/>
+          </p:cNvSpPr>
+          <p:nvPr>
+            <p:ph type="title"/>
+          </p:nvPr>
+        </p:nvSpPr>
+        <p:spPr/>
+        <p:txBody>
+          <a:bodyPr/>
+          <a:lstStyle/>
+          <a:p>
+            <a:endParaRPr lang="ru-RU"/>
+          </a:p>
+        </p:txBody>
+      </p:sp>
+      <p:pic>
+        <p:nvPicPr>
+          <p:cNvPr id="4" name="Объект 3"/>
+          <p:cNvPicPr>
+            <a:picLocks noGrp="1" noChangeAspect="1"/>
+          </p:cNvPicPr>
+          <p:nvPr>
+            <p:ph idx="1"/>
+          </p:nvPr>
+        </p:nvPicPr>
+        <p:blipFill>
+          <a:blip r:embed="rId2">
+            <a:extLst>
+              <a:ext uri="{28A0092B-C50C-407E-A947-70E740481C1C}">
+                <a14:useLocalDpi xmlns:a14="http://schemas.microsoft.com/office/drawing/2010/main" val="0"/>
+              </a:ext>
+            </a:extLst>
+          </a:blip>
+          <a:stretch>
+            <a:fillRect/>
+          </a:stretch>
+        </p:blipFill>
+        <p:spPr>
+          <a:xfrm>
+            <a:off x="-1" y="-1"/>
+            <a:ext cx="9142969" cy="6858001"/>
+          </a:xfrm>
+        </p:spPr>
+      </p:pic>
+    </p:spTree>
+    <p:extLst>
+      <p:ext uri="{BB962C8B-B14F-4D97-AF65-F5344CB8AC3E}">
+        <p14:creationId xmlns:p14="http://schemas.microsoft.com/office/powerpoint/2010/main" val="1800046241"/>
+      </p:ext>
+    </p:extLst>
+  </p:cSld>
+  <p:clrMapOvr>
+    <a:masterClrMapping/>
+  </p:clrMapOvr>
+</p:sld>
+</file>
+
+<file path=ppt/slides/slide5.xml><?xml version="1.0" encoding="utf-8"?>
+<p:sld xmlns:a="http://schemas.openxmlformats.org/drawingml/2006/main" xmlns:r="http://schemas.openxmlformats.org/officeDocument/2006/relationships" xmlns:p="http://schemas.openxmlformats.org/presentationml/2006/main">
+  <p:cSld>
+    <p:spTree>
+      <p:nvGrpSpPr>
+        <p:cNvPr id="1" name=""/>
+        <p:cNvGrpSpPr/>
+        <p:nvPr/>
+      </p:nvGrpSpPr>
+      <p:grpSpPr>
+        <a:xfrm>
+          <a:off x="0" y="0"/>
+          <a:ext cx="0" cy="0"/>
+          <a:chOff x="0" y="0"/>
+          <a:chExt cx="0" cy="0"/>
+        </a:xfrm>
+      </p:grpSpPr>
+      <p:sp>
+        <p:nvSpPr>
+          <p:cNvPr id="2" name="Заголовок 1"/>
+          <p:cNvSpPr>
+            <a:spLocks noGrp="1"/>
+          </p:cNvSpPr>
+          <p:nvPr>
+            <p:ph type="title"/>
+          </p:nvPr>
+        </p:nvSpPr>
+        <p:spPr/>
+        <p:txBody>
+          <a:bodyPr/>
+          <a:lstStyle/>
+          <a:p>
+            <a:r>
+              <a:rPr lang="ru-RU" dirty="0" smtClean="0"/>
+              <a:t>Цели курсового проекта</a:t>
+            </a:r>
+            <a:endParaRPr lang="ru-RU" dirty="0"/>
+          </a:p>
+        </p:txBody>
+      </p:sp>
+      <p:sp>
+        <p:nvSpPr>
+          <p:cNvPr id="3" name="Объект 2"/>
+          <p:cNvSpPr>
+            <a:spLocks noGrp="1"/>
+          </p:cNvSpPr>
+          <p:nvPr>
+            <p:ph idx="1"/>
+          </p:nvPr>
+        </p:nvSpPr>
+        <p:spPr/>
+        <p:txBody>
+          <a:bodyPr/>
+          <a:lstStyle/>
+          <a:p>
+            <a:r>
+              <a:rPr lang="ru-RU" dirty="0" smtClean="0"/>
+              <a:t>Изучить парадигмы ООП, основные понятия и принципы работы с объектами, классами и интерфейсами.</a:t>
+            </a:r>
+          </a:p>
+          <a:p>
+            <a:r>
+              <a:rPr lang="ru-RU" dirty="0" smtClean="0"/>
+              <a:t>Получить навыки разработки приложений на объектно-ориентированном языке программирования </a:t>
+            </a:r>
+            <a:r>
+              <a:rPr lang="en-US" dirty="0" smtClean="0"/>
+              <a:t>Java</a:t>
+            </a:r>
+            <a:endParaRPr lang="ru-RU" dirty="0" smtClean="0"/>
+          </a:p>
+          <a:p>
+            <a:r>
+              <a:rPr lang="ru-RU" dirty="0" smtClean="0"/>
+              <a:t>Разработать программный продукт, реализующий базовый алгоритм сортировки структуры данных, используя сортировку Шелла</a:t>
+            </a:r>
+            <a:endParaRPr lang="ru-RU" dirty="0"/>
+          </a:p>
+        </p:txBody>
+      </p:sp>
+    </p:spTree>
+    <p:extLst>
+      <p:ext uri="{BB962C8B-B14F-4D97-AF65-F5344CB8AC3E}">
+        <p14:creationId xmlns:p14="http://schemas.microsoft.com/office/powerpoint/2010/main" val="3249374362"/>
+      </p:ext>
+    </p:extLst>
+  </p:cSld>
+  <p:clrMapOvr>
+    <a:masterClrMapping/>
+  </p:clrMapOvr>
+</p:sld>
+</file>
+
+<file path=ppt/slides/slide6.xml><?xml version="1.0" encoding="utf-8"?>
+<p:sld xmlns:a="http://schemas.openxmlformats.org/drawingml/2006/main" xmlns:r="http://schemas.openxmlformats.org/officeDocument/2006/relationships" xmlns:p="http://schemas.openxmlformats.org/presentationml/2006/main">
+  <p:cSld>
+    <p:spTree>
+      <p:nvGrpSpPr>
+        <p:cNvPr id="1" name=""/>
+        <p:cNvGrpSpPr/>
+        <p:nvPr/>
+      </p:nvGrpSpPr>
+      <p:grpSpPr>
+        <a:xfrm>
+          <a:off x="0" y="0"/>
+          <a:ext cx="0" cy="0"/>
+          <a:chOff x="0" y="0"/>
+          <a:chExt cx="0" cy="0"/>
+        </a:xfrm>
+      </p:grpSpPr>
+      <p:sp>
+        <p:nvSpPr>
+          <p:cNvPr id="2" name="Заголовок 1"/>
+          <p:cNvSpPr>
+            <a:spLocks noGrp="1"/>
+          </p:cNvSpPr>
+          <p:nvPr>
+            <p:ph type="title"/>
+          </p:nvPr>
+        </p:nvSpPr>
+        <p:spPr/>
+        <p:txBody>
+          <a:bodyPr/>
+          <a:lstStyle/>
+          <a:p>
+            <a:r>
+              <a:rPr lang="ru-RU" dirty="0" smtClean="0"/>
+              <a:t>Задачи курсового проекта</a:t>
+            </a:r>
+            <a:endParaRPr lang="ru-RU" dirty="0"/>
+          </a:p>
+        </p:txBody>
+      </p:sp>
+      <p:sp>
+        <p:nvSpPr>
+          <p:cNvPr id="3" name="Объект 2"/>
+          <p:cNvSpPr>
+            <a:spLocks noGrp="1"/>
+          </p:cNvSpPr>
+          <p:nvPr>
+            <p:ph idx="1"/>
+          </p:nvPr>
+        </p:nvSpPr>
+        <p:spPr/>
+        <p:txBody>
+          <a:bodyPr/>
+          <a:lstStyle/>
+          <a:p>
+            <a:r>
+              <a:rPr lang="ru-RU" dirty="0" smtClean="0"/>
+              <a:t>Спроектировать программный продукт</a:t>
+            </a:r>
+          </a:p>
+          <a:p>
+            <a:r>
+              <a:rPr lang="ru-RU" dirty="0" smtClean="0"/>
+              <a:t>Написать программный код продукта</a:t>
+            </a:r>
+          </a:p>
+          <a:p>
+            <a:r>
+              <a:rPr lang="ru-RU" dirty="0" smtClean="0"/>
+              <a:t>Разработать интерфейс продукта</a:t>
+            </a:r>
+          </a:p>
+          <a:p>
+            <a:r>
+              <a:rPr lang="ru-RU" dirty="0" smtClean="0"/>
+              <a:t>Протестировать программный продукт</a:t>
+            </a:r>
+          </a:p>
+          <a:p>
+            <a:r>
+              <a:rPr lang="ru-RU" dirty="0" smtClean="0"/>
+              <a:t>Отладить программный продукт</a:t>
+            </a:r>
+            <a:endParaRPr lang="ru-RU" dirty="0"/>
+          </a:p>
+        </p:txBody>
+      </p:sp>
+    </p:spTree>
+    <p:extLst>
+      <p:ext uri="{BB962C8B-B14F-4D97-AF65-F5344CB8AC3E}">
+        <p14:creationId xmlns:p14="http://schemas.microsoft.com/office/powerpoint/2010/main" val="2321011356"/>
+      </p:ext>
+    </p:extLst>
+  </p:cSld>
+  <p:clrMapOvr>
+    <a:masterClrMapping/>
+  </p:clrMapOvr>
+</p:sld>
+</file>
+
+<file path=ppt/slides/slide7.xml><?xml version="1.0" encoding="utf-8"?>
+<p:sld xmlns:a="http://schemas.openxmlformats.org/drawingml/2006/main" xmlns:r="http://schemas.openxmlformats.org/officeDocument/2006/relationships" xmlns:p="http://schemas.openxmlformats.org/presentationml/2006/main">
+  <p:cSld>
+    <p:spTree>
+      <p:nvGrpSpPr>
+        <p:cNvPr id="1" name=""/>
+        <p:cNvGrpSpPr/>
+        <p:nvPr/>
+      </p:nvGrpSpPr>
+      <p:grpSpPr>
+        <a:xfrm>
+          <a:off x="0" y="0"/>
+          <a:ext cx="0" cy="0"/>
+          <a:chOff x="0" y="0"/>
+          <a:chExt cx="0" cy="0"/>
+        </a:xfrm>
+      </p:grpSpPr>
+      <p:sp>
+        <p:nvSpPr>
+          <p:cNvPr id="2" name="Заголовок 1"/>
+          <p:cNvSpPr>
+            <a:spLocks noGrp="1"/>
+          </p:cNvSpPr>
+          <p:nvPr>
+            <p:ph type="title"/>
+          </p:nvPr>
+        </p:nvSpPr>
+        <p:spPr/>
+        <p:txBody>
+          <a:bodyPr/>
+          <a:lstStyle/>
+          <a:p>
+            <a:r>
+              <a:rPr lang="ru-RU" dirty="0" smtClean="0"/>
+              <a:t>Система контроля версий</a:t>
+            </a:r>
+            <a:endParaRPr lang="ru-RU" dirty="0"/>
+          </a:p>
+        </p:txBody>
+      </p:sp>
+      <p:pic>
+        <p:nvPicPr>
+          <p:cNvPr id="4" name="Рисунок 3"/>
+          <p:cNvPicPr>
+            <a:picLocks noChangeAspect="1"/>
+          </p:cNvPicPr>
+          <p:nvPr/>
+        </p:nvPicPr>
+        <p:blipFill>
+          <a:blip r:embed="rId2">
+            <a:extLst>
+              <a:ext uri="{28A0092B-C50C-407E-A947-70E740481C1C}">
+                <a14:useLocalDpi xmlns:a14="http://schemas.microsoft.com/office/drawing/2010/main" val="0"/>
+              </a:ext>
+            </a:extLst>
+          </a:blip>
+          <a:stretch>
+            <a:fillRect/>
+          </a:stretch>
+        </p:blipFill>
+        <p:spPr>
+          <a:xfrm>
+            <a:off x="5749368" y="1731659"/>
+            <a:ext cx="2143125" cy="2143125"/>
+          </a:xfrm>
+          <a:prstGeom prst="rect">
+            <a:avLst/>
+          </a:prstGeom>
+        </p:spPr>
+      </p:pic>
+      <p:sp>
+        <p:nvSpPr>
+          <p:cNvPr id="5" name="Прямоугольник 4"/>
+          <p:cNvSpPr/>
+          <p:nvPr/>
+        </p:nvSpPr>
+        <p:spPr>
+          <a:xfrm>
+            <a:off x="329650" y="1731659"/>
+            <a:ext cx="4894289" cy="923330"/>
+          </a:xfrm>
+          <a:prstGeom prst="rect">
+            <a:avLst/>
+          </a:prstGeom>
+          <a:noFill/>
+          <a:ln w="28575">
+            <a:noFill/>
+          </a:ln>
+        </p:spPr>
+        <p:txBody>
+          <a:bodyPr wrap="none" lIns="91440" tIns="45720" rIns="91440" bIns="45720">
+            <a:spAutoFit/>
+          </a:bodyPr>
+          <a:lstStyle/>
+          <a:p>
+            <a:pPr algn="ctr"/>
+            <a:r>
+              <a:rPr lang="en-US" sz="5400" b="1" dirty="0" err="1" smtClean="0">
+                <a:ln w="28575">
+                  <a:solidFill>
+                    <a:schemeClr val="accent2">
+                      <a:satMod val="140000"/>
+                    </a:schemeClr>
+                  </a:solidFill>
+                  <a:prstDash val="solid"/>
+                  <a:miter lim="800000"/>
+                </a:ln>
+                <a:noFill/>
+                <a:effectLst>
+                  <a:outerShdw blurRad="25500" dist="23000" dir="7020000" algn="tl">
+                    <a:srgbClr val="000000">
+                      <a:alpha val="50000"/>
+                    </a:srgbClr>
+                  </a:outerShdw>
+                </a:effectLst>
+              </a:rPr>
+              <a:t>Git</a:t>
+            </a:r>
+            <a:r>
+              <a:rPr lang="en-US" sz="5400" b="1" dirty="0" smtClean="0">
+                <a:ln w="28575">
+                  <a:solidFill>
+                    <a:schemeClr val="accent2">
+                      <a:satMod val="140000"/>
+                    </a:schemeClr>
+                  </a:solidFill>
+                  <a:prstDash val="solid"/>
+                  <a:miter lim="800000"/>
+                </a:ln>
+                <a:noFill/>
+                <a:effectLst>
+                  <a:outerShdw blurRad="25500" dist="23000" dir="7020000" algn="tl">
+                    <a:srgbClr val="000000">
+                      <a:alpha val="50000"/>
+                    </a:srgbClr>
+                  </a:outerShdw>
+                </a:effectLst>
+              </a:rPr>
+              <a:t> </a:t>
+            </a:r>
+            <a:r>
+              <a:rPr lang="ru-RU" sz="5400" b="1" dirty="0" smtClean="0">
+                <a:ln w="28575">
+                  <a:solidFill>
+                    <a:schemeClr val="accent2">
+                      <a:satMod val="140000"/>
+                    </a:schemeClr>
+                  </a:solidFill>
+                  <a:prstDash val="solid"/>
+                  <a:miter lim="800000"/>
+                </a:ln>
+                <a:noFill/>
+                <a:effectLst>
+                  <a:outerShdw blurRad="25500" dist="23000" dir="7020000" algn="tl">
+                    <a:srgbClr val="000000">
+                      <a:alpha val="50000"/>
+                    </a:srgbClr>
+                  </a:outerShdw>
+                </a:effectLst>
+              </a:rPr>
+              <a:t>версии 2.7.3</a:t>
+            </a:r>
+            <a:endParaRPr lang="ru-RU" sz="5400" b="1" cap="none" spc="0" dirty="0">
+              <a:ln w="28575">
+                <a:solidFill>
+                  <a:schemeClr val="accent2">
+                    <a:satMod val="140000"/>
+                  </a:schemeClr>
+                </a:solidFill>
+                <a:prstDash val="solid"/>
+                <a:miter lim="800000"/>
+              </a:ln>
+              <a:noFill/>
+              <a:effectLst>
+                <a:outerShdw blurRad="25500" dist="23000" dir="7020000" algn="tl">
+                  <a:srgbClr val="000000">
+                    <a:alpha val="50000"/>
+                  </a:srgbClr>
+                </a:outerShdw>
+              </a:effectLst>
+            </a:endParaRPr>
+          </a:p>
+        </p:txBody>
+      </p:sp>
+      <p:pic>
+        <p:nvPicPr>
+          <p:cNvPr id="6" name="Рисунок 5"/>
+          <p:cNvPicPr>
+            <a:picLocks noChangeAspect="1"/>
+          </p:cNvPicPr>
+          <p:nvPr/>
+        </p:nvPicPr>
+        <p:blipFill>
+          <a:blip r:embed="rId3">
+            <a:extLst>
+              <a:ext uri="{28A0092B-C50C-407E-A947-70E740481C1C}">
+                <a14:useLocalDpi xmlns:a14="http://schemas.microsoft.com/office/drawing/2010/main" val="0"/>
+              </a:ext>
+            </a:extLst>
+          </a:blip>
+          <a:stretch>
+            <a:fillRect/>
+          </a:stretch>
+        </p:blipFill>
+        <p:spPr>
+          <a:xfrm>
+            <a:off x="6260757" y="4351638"/>
+            <a:ext cx="2133600" cy="2133600"/>
+          </a:xfrm>
+          <a:prstGeom prst="rect">
+            <a:avLst/>
+          </a:prstGeom>
+        </p:spPr>
+      </p:pic>
+      <p:sp>
+        <p:nvSpPr>
+          <p:cNvPr id="7" name="Прямоугольник 6"/>
+          <p:cNvSpPr/>
+          <p:nvPr/>
+        </p:nvSpPr>
+        <p:spPr>
+          <a:xfrm>
+            <a:off x="-62449" y="3763306"/>
+            <a:ext cx="6323206" cy="2585323"/>
+          </a:xfrm>
+          <a:prstGeom prst="rect">
+            <a:avLst/>
+          </a:prstGeom>
+          <a:noFill/>
+        </p:spPr>
+        <p:txBody>
+          <a:bodyPr wrap="none" lIns="91440" tIns="45720" rIns="91440" bIns="45720">
+            <a:spAutoFit/>
+          </a:bodyPr>
+          <a:lstStyle/>
+          <a:p>
+            <a:pPr algn="ctr"/>
+            <a:r>
+              <a:rPr lang="en-US" sz="5400" b="1" dirty="0" err="1" smtClean="0">
+                <a:ln w="17780" cmpd="sng">
+                  <a:solidFill>
+                    <a:srgbClr val="FFFFFF"/>
+                  </a:solidFill>
+                  <a:prstDash val="solid"/>
+                  <a:miter lim="800000"/>
+                </a:ln>
+                <a:gradFill rotWithShape="1">
+                  <a:gsLst>
+                    <a:gs pos="0">
+                      <a:srgbClr val="000000">
+                        <a:tint val="92000"/>
+                        <a:shade val="100000"/>
+                        <a:satMod val="150000"/>
+                      </a:srgbClr>
+                    </a:gs>
+                    <a:gs pos="49000">
+                      <a:srgbClr val="000000">
+                        <a:tint val="89000"/>
+                        <a:shade val="90000"/>
+                        <a:satMod val="150000"/>
+                      </a:srgbClr>
+                    </a:gs>
+                    <a:gs pos="50000">
+                      <a:srgbClr val="000000">
+                        <a:tint val="100000"/>
+                        <a:shade val="75000"/>
+                        <a:satMod val="150000"/>
+                      </a:srgbClr>
+                    </a:gs>
+                    <a:gs pos="95000">
+                      <a:srgbClr val="000000">
+                        <a:shade val="47000"/>
+                        <a:satMod val="150000"/>
+                      </a:srgbClr>
+                    </a:gs>
+                    <a:gs pos="100000">
+                      <a:srgbClr val="000000">
+                        <a:shade val="39000"/>
+                        <a:satMod val="150000"/>
+                      </a:srgbClr>
+                    </a:gs>
+                  </a:gsLst>
+                  <a:lin ang="5400000"/>
+                </a:gradFill>
+                <a:effectLst>
+                  <a:outerShdw blurRad="50800" algn="tl" rotWithShape="0">
+                    <a:srgbClr val="000000"/>
+                  </a:outerShdw>
+                </a:effectLst>
+              </a:rPr>
+              <a:t>GitHub</a:t>
+            </a:r>
+            <a:r>
+              <a:rPr lang="en-US" sz="5400" b="1" dirty="0" smtClean="0">
+                <a:ln w="17780" cmpd="sng">
+                  <a:solidFill>
+                    <a:srgbClr val="FFFFFF"/>
+                  </a:solidFill>
+                  <a:prstDash val="solid"/>
+                  <a:miter lim="800000"/>
+                </a:ln>
+                <a:gradFill rotWithShape="1">
+                  <a:gsLst>
+                    <a:gs pos="0">
+                      <a:srgbClr val="000000">
+                        <a:tint val="92000"/>
+                        <a:shade val="100000"/>
+                        <a:satMod val="150000"/>
+                      </a:srgbClr>
+                    </a:gs>
+                    <a:gs pos="49000">
+                      <a:srgbClr val="000000">
+                        <a:tint val="89000"/>
+                        <a:shade val="90000"/>
+                        <a:satMod val="150000"/>
+                      </a:srgbClr>
+                    </a:gs>
+                    <a:gs pos="50000">
+                      <a:srgbClr val="000000">
+                        <a:tint val="100000"/>
+                        <a:shade val="75000"/>
+                        <a:satMod val="150000"/>
+                      </a:srgbClr>
+                    </a:gs>
+                    <a:gs pos="95000">
+                      <a:srgbClr val="000000">
+                        <a:shade val="47000"/>
+                        <a:satMod val="150000"/>
+                      </a:srgbClr>
+                    </a:gs>
+                    <a:gs pos="100000">
+                      <a:srgbClr val="000000">
+                        <a:shade val="39000"/>
+                        <a:satMod val="150000"/>
+                      </a:srgbClr>
+                    </a:gs>
+                  </a:gsLst>
+                  <a:lin ang="5400000"/>
+                </a:gradFill>
+                <a:effectLst>
+                  <a:outerShdw blurRad="50800" algn="tl" rotWithShape="0">
+                    <a:srgbClr val="000000"/>
+                  </a:outerShdw>
+                </a:effectLst>
+              </a:rPr>
+              <a:t> – </a:t>
+            </a:r>
+            <a:endParaRPr lang="ru-RU" sz="5400" b="1" dirty="0" smtClean="0">
+              <a:ln w="17780" cmpd="sng">
+                <a:solidFill>
+                  <a:srgbClr val="FFFFFF"/>
+                </a:solidFill>
+                <a:prstDash val="solid"/>
+                <a:miter lim="800000"/>
+              </a:ln>
+              <a:gradFill rotWithShape="1">
+                <a:gsLst>
+                  <a:gs pos="0">
+                    <a:srgbClr val="000000">
+                      <a:tint val="92000"/>
+                      <a:shade val="100000"/>
+                      <a:satMod val="150000"/>
+                    </a:srgbClr>
+                  </a:gs>
+                  <a:gs pos="49000">
+                    <a:srgbClr val="000000">
+                      <a:tint val="89000"/>
+                      <a:shade val="90000"/>
+                      <a:satMod val="150000"/>
+                    </a:srgbClr>
+                  </a:gs>
+                  <a:gs pos="50000">
+                    <a:srgbClr val="000000">
+                      <a:tint val="100000"/>
+                      <a:shade val="75000"/>
+                      <a:satMod val="150000"/>
+                    </a:srgbClr>
+                  </a:gs>
+                  <a:gs pos="95000">
+                    <a:srgbClr val="000000">
+                      <a:shade val="47000"/>
+                      <a:satMod val="150000"/>
+                    </a:srgbClr>
+                  </a:gs>
+                  <a:gs pos="100000">
+                    <a:srgbClr val="000000">
+                      <a:shade val="39000"/>
+                      <a:satMod val="150000"/>
+                    </a:srgbClr>
+                  </a:gs>
+                </a:gsLst>
+                <a:lin ang="5400000"/>
+              </a:gradFill>
+              <a:effectLst>
+                <a:outerShdw blurRad="50800" algn="tl" rotWithShape="0">
+                  <a:srgbClr val="000000"/>
+                </a:outerShdw>
+              </a:effectLst>
+            </a:endParaRPr>
+          </a:p>
+          <a:p>
+            <a:pPr algn="ctr"/>
+            <a:r>
+              <a:rPr lang="ru-RU" sz="5400" b="1" dirty="0" smtClean="0">
+                <a:ln w="17780" cmpd="sng">
+                  <a:solidFill>
+                    <a:srgbClr val="FFFFFF"/>
+                  </a:solidFill>
+                  <a:prstDash val="solid"/>
+                  <a:miter lim="800000"/>
+                </a:ln>
+                <a:gradFill rotWithShape="1">
+                  <a:gsLst>
+                    <a:gs pos="0">
+                      <a:srgbClr val="000000">
+                        <a:tint val="92000"/>
+                        <a:shade val="100000"/>
+                        <a:satMod val="150000"/>
+                      </a:srgbClr>
+                    </a:gs>
+                    <a:gs pos="49000">
+                      <a:srgbClr val="000000">
+                        <a:tint val="89000"/>
+                        <a:shade val="90000"/>
+                        <a:satMod val="150000"/>
+                      </a:srgbClr>
+                    </a:gs>
+                    <a:gs pos="50000">
+                      <a:srgbClr val="000000">
+                        <a:tint val="100000"/>
+                        <a:shade val="75000"/>
+                        <a:satMod val="150000"/>
+                      </a:srgbClr>
+                    </a:gs>
+                    <a:gs pos="95000">
+                      <a:srgbClr val="000000">
+                        <a:shade val="47000"/>
+                        <a:satMod val="150000"/>
+                      </a:srgbClr>
+                    </a:gs>
+                    <a:gs pos="100000">
+                      <a:srgbClr val="000000">
+                        <a:shade val="39000"/>
+                        <a:satMod val="150000"/>
+                      </a:srgbClr>
+                    </a:gs>
+                  </a:gsLst>
+                  <a:lin ang="5400000"/>
+                </a:gradFill>
+                <a:effectLst>
+                  <a:outerShdw blurRad="50800" algn="tl" rotWithShape="0">
+                    <a:srgbClr val="000000"/>
+                  </a:outerShdw>
+                </a:effectLst>
+              </a:rPr>
+              <a:t>облачный сервис</a:t>
+            </a:r>
+          </a:p>
+          <a:p>
+            <a:pPr algn="ctr"/>
+            <a:r>
+              <a:rPr lang="ru-RU" sz="5400" b="1" dirty="0" smtClean="0">
+                <a:ln w="17780" cmpd="sng">
+                  <a:solidFill>
+                    <a:srgbClr val="FFFFFF"/>
+                  </a:solidFill>
+                  <a:prstDash val="solid"/>
+                  <a:miter lim="800000"/>
+                </a:ln>
+                <a:gradFill rotWithShape="1">
+                  <a:gsLst>
+                    <a:gs pos="0">
+                      <a:srgbClr val="000000">
+                        <a:tint val="92000"/>
+                        <a:shade val="100000"/>
+                        <a:satMod val="150000"/>
+                      </a:srgbClr>
+                    </a:gs>
+                    <a:gs pos="49000">
+                      <a:srgbClr val="000000">
+                        <a:tint val="89000"/>
+                        <a:shade val="90000"/>
+                        <a:satMod val="150000"/>
+                      </a:srgbClr>
+                    </a:gs>
+                    <a:gs pos="50000">
+                      <a:srgbClr val="000000">
+                        <a:tint val="100000"/>
+                        <a:shade val="75000"/>
+                        <a:satMod val="150000"/>
+                      </a:srgbClr>
+                    </a:gs>
+                    <a:gs pos="95000">
+                      <a:srgbClr val="000000">
+                        <a:shade val="47000"/>
+                        <a:satMod val="150000"/>
+                      </a:srgbClr>
+                    </a:gs>
+                    <a:gs pos="100000">
+                      <a:srgbClr val="000000">
+                        <a:shade val="39000"/>
+                        <a:satMod val="150000"/>
+                      </a:srgbClr>
+                    </a:gs>
+                  </a:gsLst>
+                  <a:lin ang="5400000"/>
+                </a:gradFill>
+                <a:effectLst>
+                  <a:outerShdw blurRad="50800" algn="tl" rotWithShape="0">
+                    <a:srgbClr val="000000"/>
+                  </a:outerShdw>
+                </a:effectLst>
+              </a:rPr>
+              <a:t> для программистов</a:t>
+            </a:r>
+            <a:endParaRPr lang="ru-RU" sz="5400" b="1" cap="none" spc="0" dirty="0">
+              <a:ln w="17780" cmpd="sng">
+                <a:solidFill>
+                  <a:srgbClr val="FFFFFF"/>
+                </a:solidFill>
+                <a:prstDash val="solid"/>
+                <a:miter lim="800000"/>
+              </a:ln>
+              <a:gradFill rotWithShape="1">
+                <a:gsLst>
+                  <a:gs pos="0">
+                    <a:srgbClr val="000000">
+                      <a:tint val="92000"/>
+                      <a:shade val="100000"/>
+                      <a:satMod val="150000"/>
+                    </a:srgbClr>
+                  </a:gs>
+                  <a:gs pos="49000">
+                    <a:srgbClr val="000000">
+                      <a:tint val="89000"/>
+                      <a:shade val="90000"/>
+                      <a:satMod val="150000"/>
+                    </a:srgbClr>
+                  </a:gs>
+                  <a:gs pos="50000">
+                    <a:srgbClr val="000000">
+                      <a:tint val="100000"/>
+                      <a:shade val="75000"/>
+                      <a:satMod val="150000"/>
+                    </a:srgbClr>
+                  </a:gs>
+                  <a:gs pos="95000">
+                    <a:srgbClr val="000000">
+                      <a:shade val="47000"/>
+                      <a:satMod val="150000"/>
+                    </a:srgbClr>
+                  </a:gs>
+                  <a:gs pos="100000">
+                    <a:srgbClr val="000000">
+                      <a:shade val="39000"/>
+                      <a:satMod val="150000"/>
+                    </a:srgbClr>
+                  </a:gs>
+                </a:gsLst>
+                <a:lin ang="5400000"/>
+              </a:gradFill>
+              <a:effectLst>
+                <a:outerShdw blurRad="50800" algn="tl" rotWithShape="0">
+                  <a:srgbClr val="000000"/>
+                </a:outerShdw>
+              </a:effectLst>
+            </a:endParaRPr>
+          </a:p>
+        </p:txBody>
+      </p:sp>
+    </p:spTree>
+    <p:extLst>
+      <p:ext uri="{BB962C8B-B14F-4D97-AF65-F5344CB8AC3E}">
+        <p14:creationId xmlns:p14="http://schemas.microsoft.com/office/powerpoint/2010/main" val="1302833774"/>
+      </p:ext>
+    </p:extLst>
+  </p:cSld>
+  <p:clrMapOvr>
+    <a:masterClrMapping/>
+  </p:clrMapOvr>
+</p:sld>
+</file>
+
+<file path=ppt/slides/slide8.xml><?xml version="1.0" encoding="utf-8"?>
+<p:sld xmlns:a="http://schemas.openxmlformats.org/drawingml/2006/main" xmlns:r="http://schemas.openxmlformats.org/officeDocument/2006/relationships" xmlns:p="http://schemas.openxmlformats.org/presentationml/2006/main">
+  <p:cSld>
+    <p:spTree>
+      <p:nvGrpSpPr>
+        <p:cNvPr id="1" name=""/>
+        <p:cNvGrpSpPr/>
+        <p:nvPr/>
+      </p:nvGrpSpPr>
+      <p:grpSpPr>
+        <a:xfrm>
+          <a:off x="0" y="0"/>
+          <a:ext cx="0" cy="0"/>
+          <a:chOff x="0" y="0"/>
+          <a:chExt cx="0" cy="0"/>
+        </a:xfrm>
+      </p:grpSpPr>
+      <p:sp>
+        <p:nvSpPr>
+          <p:cNvPr id="2" name="Заголовок 1"/>
+          <p:cNvSpPr>
+            <a:spLocks noGrp="1"/>
+          </p:cNvSpPr>
+          <p:nvPr>
+            <p:ph type="title"/>
+          </p:nvPr>
+        </p:nvSpPr>
+        <p:spPr/>
+        <p:txBody>
+          <a:bodyPr/>
+          <a:lstStyle/>
+          <a:p>
+            <a:endParaRPr lang="ru-RU"/>
+          </a:p>
+        </p:txBody>
+      </p:sp>
+      <p:pic>
+        <p:nvPicPr>
+          <p:cNvPr id="4" name="Объект 3"/>
+          <p:cNvPicPr>
+            <a:picLocks noGrp="1" noChangeAspect="1"/>
+          </p:cNvPicPr>
+          <p:nvPr>
+            <p:ph idx="1"/>
+          </p:nvPr>
+        </p:nvPicPr>
+        <p:blipFill>
+          <a:blip r:embed="rId2">
+            <a:extLst>
+              <a:ext uri="{28A0092B-C50C-407E-A947-70E740481C1C}">
+                <a14:useLocalDpi xmlns:a14="http://schemas.microsoft.com/office/drawing/2010/main" val="0"/>
+              </a:ext>
+            </a:extLst>
+          </a:blip>
+          <a:stretch>
+            <a:fillRect/>
+          </a:stretch>
+        </p:blipFill>
+        <p:spPr>
+          <a:xfrm>
+            <a:off x="0" y="0"/>
+            <a:ext cx="9164948" cy="6858000"/>
+          </a:xfrm>
+        </p:spPr>
+      </p:pic>
+    </p:spTree>
+    <p:extLst>
+      <p:ext uri="{BB962C8B-B14F-4D97-AF65-F5344CB8AC3E}">
+        <p14:creationId xmlns:p14="http://schemas.microsoft.com/office/powerpoint/2010/main" val="319655183"/>
+      </p:ext>
+    </p:extLst>
+  </p:cSld>
+  <p:clrMapOvr>
+    <a:masterClrMapping/>
+  </p:clrMapOvr>
+</p:sld>
+</file>
+
+<file path=ppt/slides/slide9.xml><?xml version="1.0" encoding="utf-8"?>
+<p:sld xmlns:a="http://schemas.openxmlformats.org/drawingml/2006/main" xmlns:r="http://schemas.openxmlformats.org/officeDocument/2006/relationships" xmlns:p="http://schemas.openxmlformats.org/presentationml/2006/main">
+  <p:cSld>
+    <p:spTree>
+      <p:nvGrpSpPr>
+        <p:cNvPr id="1" name=""/>
+        <p:cNvGrpSpPr/>
+        <p:nvPr/>
+      </p:nvGrpSpPr>
+      <p:grpSpPr>
+        <a:xfrm>
+          <a:off x="0" y="0"/>
+          <a:ext cx="0" cy="0"/>
+          <a:chOff x="0" y="0"/>
+          <a:chExt cx="0" cy="0"/>
+        </a:xfrm>
+      </p:grpSpPr>
+      <p:sp>
+        <p:nvSpPr>
+          <p:cNvPr id="2" name="Заголовок 1"/>
+          <p:cNvSpPr>
+            <a:spLocks noGrp="1"/>
+          </p:cNvSpPr>
+          <p:nvPr>
+            <p:ph type="title"/>
+          </p:nvPr>
+        </p:nvSpPr>
+        <p:spPr/>
+        <p:txBody>
+          <a:bodyPr/>
+          <a:lstStyle/>
+          <a:p>
+            <a:r>
+              <a:rPr lang="ru-RU" dirty="0" smtClean="0"/>
+              <a:t>Код сортировки Шелла</a:t>
+            </a:r>
+            <a:endParaRPr lang="ru-RU" dirty="0"/>
+          </a:p>
+        </p:txBody>
+      </p:sp>
+      <p:pic>
+        <p:nvPicPr>
+          <p:cNvPr id="4" name="Объект 3"/>
+          <p:cNvPicPr>
+            <a:picLocks noGrp="1" noChangeAspect="1"/>
+          </p:cNvPicPr>
+          <p:nvPr>
+            <p:ph idx="1"/>
+          </p:nvPr>
+        </p:nvPicPr>
+        <p:blipFill>
+          <a:blip r:embed="rId2">
+            <a:extLst>
+              <a:ext uri="{28A0092B-C50C-407E-A947-70E740481C1C}">
+                <a14:useLocalDpi xmlns:a14="http://schemas.microsoft.com/office/drawing/2010/main" val="0"/>
+              </a:ext>
+            </a:extLst>
+          </a:blip>
+          <a:stretch>
+            <a:fillRect/>
+          </a:stretch>
+        </p:blipFill>
+        <p:spPr>
+          <a:xfrm>
+            <a:off x="20729" y="2336450"/>
+            <a:ext cx="9123271" cy="4521550"/>
+          </a:xfrm>
+        </p:spPr>
+      </p:pic>
+    </p:spTree>
+    <p:extLst>
+      <p:ext uri="{BB962C8B-B14F-4D97-AF65-F5344CB8AC3E}">
+        <p14:creationId xmlns:p14="http://schemas.microsoft.com/office/powerpoint/2010/main" val="1099525467"/>
+      </p:ext>
+    </p:extLst>
+  </p:cSld>
+  <p:clrMapOvr>
+    <a:masterClrMapping/>
+  </p:clrMapOvr>
+</p:sld>
+</file>
+
 <file path=ppt/theme/theme1.xml><?xml version="1.0" encoding="utf-8"?>
 <a:theme xmlns:a="http://schemas.openxmlformats.org/drawingml/2006/main" name="Тема Office">
   <a:themeElements>
-    <a:clrScheme name="Стандартная">
+    <a:clrScheme name="Тема Office">
       <a:dk1>
         <a:sysClr val="windowText" lastClr="000000"/>
       </a:dk1>
@@ -3026,39 +5404,39 @@
         <a:sysClr val="window" lastClr="FFFFFF"/>
       </a:lt1>
       <a:dk2>
-        <a:srgbClr val="1F497D"/>
+        <a:srgbClr val="44546A"/>
       </a:dk2>
       <a:lt2>
-        <a:srgbClr val="EEECE1"/>
+        <a:srgbClr val="E7E6E6"/>
       </a:lt2>
       <a:accent1>
-        <a:srgbClr val="4F81BD"/>
+        <a:srgbClr val="5B9BD5"/>
       </a:accent1>
       <a:accent2>
-        <a:srgbClr val="C0504D"/>
+        <a:srgbClr val="ED7D31"/>
       </a:accent2>
       <a:accent3>
-        <a:srgbClr val="9BBB59"/>
+        <a:srgbClr val="A5A5A5"/>
       </a:accent3>
       <a:accent4>
-        <a:srgbClr val="8064A2"/>
+        <a:srgbClr val="FFC000"/>
       </a:accent4>
       <a:accent5>
-        <a:srgbClr val="4BACC6"/>
+        <a:srgbClr val="4472C4"/>
       </a:accent5>
       <a:accent6>
-        <a:srgbClr val="F79646"/>
+        <a:srgbClr val="70AD47"/>
       </a:accent6>
       <a:hlink>
-        <a:srgbClr val="0000FF"/>
+        <a:srgbClr val="0563C1"/>
       </a:hlink>
       <a:folHlink>
-        <a:srgbClr val="800080"/>
+        <a:srgbClr val="954F72"/>
       </a:folHlink>
     </a:clrScheme>
-    <a:fontScheme name="Стандартная">
+    <a:fontScheme name="Тема Office">
       <a:majorFont>
-        <a:latin typeface="Calibri"/>
+        <a:latin typeface="Calibri Light" panose="020F0302020204030204"/>
         <a:ea typeface=""/>
         <a:cs typeface=""/>
         <a:font script="Jpan" typeface="ＭＳ Ｐゴシック"/>
@@ -3090,9 +5468,10 @@
         <a:font script="Mong" typeface="Mongolian Baiti"/>
         <a:font script="Viet" typeface="Times New Roman"/>
         <a:font script="Uigh" typeface="Microsoft Uighur"/>
+        <a:font script="Geor" typeface="Sylfaen"/>
       </a:majorFont>
       <a:minorFont>
-        <a:latin typeface="Calibri"/>
+        <a:latin typeface="Calibri" panose="020F0502020204030204"/>
         <a:ea typeface=""/>
         <a:cs typeface=""/>
         <a:font script="Jpan" typeface="ＭＳ Ｐゴシック"/>
@@ -3124,9 +5503,10 @@
         <a:font script="Mong" typeface="Mongolian Baiti"/>
         <a:font script="Viet" typeface="Arial"/>
         <a:font script="Uigh" typeface="Microsoft Uighur"/>
+        <a:font script="Geor" typeface="Sylfaen"/>
       </a:minorFont>
     </a:fontScheme>
-    <a:fmtScheme name="Стандартная">
+    <a:fmtScheme name="Тема Office">
       <a:fillStyleLst>
         <a:solidFill>
           <a:schemeClr val="phClr"/>
@@ -3135,165 +5515,141 @@
           <a:gsLst>
             <a:gs pos="0">
               <a:schemeClr val="phClr">
-                <a:tint val="50000"/>
-                <a:satMod val="300000"/>
+                <a:lumMod val="110000"/>
+                <a:satMod val="105000"/>
+                <a:tint val="67000"/>
               </a:schemeClr>
             </a:gs>
-            <a:gs pos="35000">
+            <a:gs pos="50000">
               <a:schemeClr val="phClr">
-                <a:tint val="37000"/>
-                <a:satMod val="300000"/>
+                <a:lumMod val="105000"/>
+                <a:satMod val="103000"/>
+                <a:tint val="73000"/>
               </a:schemeClr>
             </a:gs>
             <a:gs pos="100000">
               <a:schemeClr val="phClr">
-                <a:tint val="15000"/>
-                <a:satMod val="350000"/>
+                <a:lumMod val="105000"/>
+                <a:satMod val="109000"/>
+                <a:tint val="81000"/>
               </a:schemeClr>
             </a:gs>
           </a:gsLst>
-          <a:lin ang="16200000" scaled="1"/>
+          <a:lin ang="5400000" scaled="0"/>
         </a:gradFill>
         <a:gradFill rotWithShape="1">
           <a:gsLst>
             <a:gs pos="0">
               <a:schemeClr val="phClr">
-                <a:shade val="51000"/>
-                <a:satMod val="130000"/>
+                <a:satMod val="103000"/>
+                <a:lumMod val="102000"/>
+                <a:tint val="94000"/>
               </a:schemeClr>
             </a:gs>
-            <a:gs pos="80000">
+            <a:gs pos="50000">
               <a:schemeClr val="phClr">
-                <a:shade val="93000"/>
-                <a:satMod val="130000"/>
+                <a:satMod val="110000"/>
+                <a:lumMod val="100000"/>
+                <a:shade val="100000"/>
               </a:schemeClr>
             </a:gs>
             <a:gs pos="100000">
               <a:schemeClr val="phClr">
-                <a:shade val="94000"/>
-                <a:satMod val="135000"/>
+                <a:lumMod val="99000"/>
+                <a:satMod val="120000"/>
+                <a:shade val="78000"/>
               </a:schemeClr>
             </a:gs>
           </a:gsLst>
-          <a:lin ang="16200000" scaled="0"/>
+          <a:lin ang="5400000" scaled="0"/>
         </a:gradFill>
       </a:fillStyleLst>
       <a:lnStyleLst>
-        <a:ln w="9525" cap="flat" cmpd="sng" algn="ctr">
-          <a:solidFill>
-            <a:schemeClr val="phClr">
-              <a:shade val="95000"/>
-              <a:satMod val="105000"/>
-            </a:schemeClr>
-          </a:solidFill>
-          <a:prstDash val="solid"/>
-        </a:ln>
-        <a:ln w="25400" cap="flat" cmpd="sng" algn="ctr">
+        <a:ln w="6350" cap="flat" cmpd="sng" algn="ctr">
           <a:solidFill>
             <a:schemeClr val="phClr"/>
           </a:solidFill>
           <a:prstDash val="solid"/>
+          <a:miter lim="800000"/>
         </a:ln>
-        <a:ln w="38100" cap="flat" cmpd="sng" algn="ctr">
+        <a:ln w="12700" cap="flat" cmpd="sng" algn="ctr">
           <a:solidFill>
             <a:schemeClr val="phClr"/>
           </a:solidFill>
           <a:prstDash val="solid"/>
+          <a:miter lim="800000"/>
+        </a:ln>
+        <a:ln w="19050" cap="flat" cmpd="sng" algn="ctr">
+          <a:solidFill>
+            <a:schemeClr val="phClr"/>
+          </a:solidFill>
+          <a:prstDash val="solid"/>
+          <a:miter lim="800000"/>
         </a:ln>
       </a:lnStyleLst>
       <a:effectStyleLst>
         <a:effectStyle>
+          <a:effectLst/>
+        </a:effectStyle>
+        <a:effectStyle>
+          <a:effectLst/>
+        </a:effectStyle>
+        <a:effectStyle>
           <a:effectLst>
-            <a:outerShdw blurRad="40000" dist="20000" dir="5400000" rotWithShape="0">
+            <a:outerShdw blurRad="57150" dist="19050" dir="5400000" algn="ctr" rotWithShape="0">
               <a:srgbClr val="000000">
-                <a:alpha val="38000"/>
+                <a:alpha val="63000"/>
               </a:srgbClr>
             </a:outerShdw>
           </a:effectLst>
-        </a:effectStyle>
-        <a:effectStyle>
-          <a:effectLst>
-            <a:outerShdw blurRad="40000" dist="23000" dir="5400000" rotWithShape="0">
-              <a:srgbClr val="000000">
-                <a:alpha val="35000"/>
-              </a:srgbClr>
-            </a:outerShdw>
-          </a:effectLst>
-        </a:effectStyle>
-        <a:effectStyle>
-          <a:effectLst>
-            <a:outerShdw blurRad="40000" dist="23000" dir="5400000" rotWithShape="0">
-              <a:srgbClr val="000000">
-                <a:alpha val="35000"/>
-              </a:srgbClr>
-            </a:outerShdw>
-          </a:effectLst>
-          <a:scene3d>
-            <a:camera prst="orthographicFront">
-              <a:rot lat="0" lon="0" rev="0"/>
-            </a:camera>
-            <a:lightRig rig="threePt" dir="t">
-              <a:rot lat="0" lon="0" rev="1200000"/>
-            </a:lightRig>
-          </a:scene3d>
-          <a:sp3d>
-            <a:bevelT w="63500" h="25400"/>
-          </a:sp3d>
         </a:effectStyle>
       </a:effectStyleLst>
       <a:bgFillStyleLst>
         <a:solidFill>
           <a:schemeClr val="phClr"/>
         </a:solidFill>
+        <a:solidFill>
+          <a:schemeClr val="phClr">
+            <a:tint val="95000"/>
+            <a:satMod val="170000"/>
+          </a:schemeClr>
+        </a:solidFill>
         <a:gradFill rotWithShape="1">
           <a:gsLst>
             <a:gs pos="0">
               <a:schemeClr val="phClr">
-                <a:tint val="40000"/>
-                <a:satMod val="350000"/>
+                <a:tint val="93000"/>
+                <a:satMod val="150000"/>
+                <a:shade val="98000"/>
+                <a:lumMod val="102000"/>
               </a:schemeClr>
             </a:gs>
-            <a:gs pos="40000">
+            <a:gs pos="50000">
               <a:schemeClr val="phClr">
-                <a:tint val="45000"/>
-                <a:shade val="99000"/>
-                <a:satMod val="350000"/>
+                <a:tint val="98000"/>
+                <a:satMod val="130000"/>
+                <a:shade val="90000"/>
+                <a:lumMod val="103000"/>
               </a:schemeClr>
             </a:gs>
             <a:gs pos="100000">
               <a:schemeClr val="phClr">
-                <a:shade val="20000"/>
-                <a:satMod val="255000"/>
+                <a:shade val="63000"/>
+                <a:satMod val="120000"/>
               </a:schemeClr>
             </a:gs>
           </a:gsLst>
-          <a:path path="circle">
-            <a:fillToRect l="50000" t="-80000" r="50000" b="180000"/>
-          </a:path>
-        </a:gradFill>
-        <a:gradFill rotWithShape="1">
-          <a:gsLst>
-            <a:gs pos="0">
-              <a:schemeClr val="phClr">
-                <a:tint val="80000"/>
-                <a:satMod val="300000"/>
-              </a:schemeClr>
-            </a:gs>
-            <a:gs pos="100000">
-              <a:schemeClr val="phClr">
-                <a:shade val="30000"/>
-                <a:satMod val="200000"/>
-              </a:schemeClr>
-            </a:gs>
-          </a:gsLst>
-          <a:path path="circle">
-            <a:fillToRect l="50000" t="50000" r="50000" b="50000"/>
-          </a:path>
+          <a:lin ang="5400000" scaled="0"/>
         </a:gradFill>
       </a:bgFillStyleLst>
     </a:fmtScheme>
   </a:themeElements>
   <a:objectDefaults/>
   <a:extraClrSchemeLst/>
+  <a:extLst>
+    <a:ext uri="{05A4C25C-085E-4340-85A3-A5531E510DB2}">
+      <thm15:themeFamily xmlns:thm15="http://schemas.microsoft.com/office/thememl/2012/main" xmlns="" name="Office Theme" id="{62F939B6-93AF-4DB8-9C6B-D6C7DFDC589F}" vid="{4A3C46E8-61CC-4603-A589-7422A47A8E4A}"/>
+    </a:ext>
+  </a:extLst>
 </a:theme>
 </file>
</xml_diff>